<commit_message>
A few corretions after the summer chool
</commit_message>
<xml_diff>
--- a/Summer school 2024/Exercises.pptx
+++ b/Summer school 2024/Exercises.pptx
@@ -5,16 +5,16 @@
     <p:sldMasterId id="2147483648" r:id="rId1"/>
   </p:sldMasterIdLst>
   <p:notesMasterIdLst>
-    <p:notesMasterId r:id="rId21"/>
+    <p:notesMasterId r:id="rId23"/>
   </p:notesMasterIdLst>
   <p:sldIdLst>
     <p:sldId id="256" r:id="rId2"/>
     <p:sldId id="257" r:id="rId3"/>
     <p:sldId id="258" r:id="rId4"/>
     <p:sldId id="265" r:id="rId5"/>
-    <p:sldId id="315" r:id="rId6"/>
-    <p:sldId id="292" r:id="rId7"/>
-    <p:sldId id="259" r:id="rId8"/>
+    <p:sldId id="292" r:id="rId6"/>
+    <p:sldId id="259" r:id="rId7"/>
+    <p:sldId id="318" r:id="rId8"/>
     <p:sldId id="305" r:id="rId9"/>
     <p:sldId id="306" r:id="rId10"/>
     <p:sldId id="294" r:id="rId11"/>
@@ -23,10 +23,12 @@
     <p:sldId id="311" r:id="rId14"/>
     <p:sldId id="309" r:id="rId15"/>
     <p:sldId id="310" r:id="rId16"/>
-    <p:sldId id="316" r:id="rId17"/>
-    <p:sldId id="314" r:id="rId18"/>
-    <p:sldId id="317" r:id="rId19"/>
-    <p:sldId id="312" r:id="rId20"/>
+    <p:sldId id="319" r:id="rId17"/>
+    <p:sldId id="316" r:id="rId18"/>
+    <p:sldId id="314" r:id="rId19"/>
+    <p:sldId id="317" r:id="rId20"/>
+    <p:sldId id="312" r:id="rId21"/>
+    <p:sldId id="315" r:id="rId22"/>
   </p:sldIdLst>
   <p:sldSz cx="12192000" cy="6858000"/>
   <p:notesSz cx="6858000" cy="9144000"/>
@@ -133,6 +135,302 @@
 </p:presentation>
 </file>
 
+<file path=ppt/revisionInfo.xml><?xml version="1.0" encoding="utf-8"?>
+<p1510:revInfo xmlns:a="http://schemas.openxmlformats.org/drawingml/2006/main" xmlns:r="http://schemas.openxmlformats.org/officeDocument/2006/relationships" xmlns:p1510="http://schemas.microsoft.com/office/powerpoint/2015/10/main">
+  <p1510:revLst>
+    <p1510:client id="{8CF42377-F741-4ADE-BEED-5EFC9A8DF0FB}" v="2" dt="2025-01-01T16:55:46.758"/>
+  </p1510:revLst>
+</p1510:revInfo>
+</file>
+
+<file path=ppt/changesInfos/changesInfo1.xml><?xml version="1.0" encoding="utf-8"?>
+<pc:chgInfo xmlns:a="http://schemas.openxmlformats.org/drawingml/2006/main" xmlns:r="http://schemas.openxmlformats.org/officeDocument/2006/relationships" xmlns:ac="http://schemas.microsoft.com/office/drawing/2013/main/command" xmlns:pc="http://schemas.microsoft.com/office/powerpoint/2013/main/command">
+  <pc:docChgLst>
+    <pc:chgData name="Are Mjaavatten" userId="00bb58f78e5d171c" providerId="LiveId" clId="{8CF42377-F741-4ADE-BEED-5EFC9A8DF0FB}"/>
+    <pc:docChg chg="undo custSel addSld delSld modSld sldOrd">
+      <pc:chgData name="Are Mjaavatten" userId="00bb58f78e5d171c" providerId="LiveId" clId="{8CF42377-F741-4ADE-BEED-5EFC9A8DF0FB}" dt="2025-01-05T14:53:01.061" v="967" actId="20577"/>
+      <pc:docMkLst>
+        <pc:docMk/>
+      </pc:docMkLst>
+      <pc:sldChg chg="addSp modSp mod">
+        <pc:chgData name="Are Mjaavatten" userId="00bb58f78e5d171c" providerId="LiveId" clId="{8CF42377-F741-4ADE-BEED-5EFC9A8DF0FB}" dt="2025-01-01T17:03:47.477" v="513" actId="108"/>
+        <pc:sldMkLst>
+          <pc:docMk/>
+          <pc:sldMk cId="855437036" sldId="257"/>
+        </pc:sldMkLst>
+        <pc:spChg chg="mod">
+          <ac:chgData name="Are Mjaavatten" userId="00bb58f78e5d171c" providerId="LiveId" clId="{8CF42377-F741-4ADE-BEED-5EFC9A8DF0FB}" dt="2025-01-01T16:59:23.697" v="507" actId="27636"/>
+          <ac:spMkLst>
+            <pc:docMk/>
+            <pc:sldMk cId="855437036" sldId="257"/>
+            <ac:spMk id="3" creationId="{92BAF697-D279-033F-7272-6A2419625974}"/>
+          </ac:spMkLst>
+        </pc:spChg>
+        <pc:spChg chg="add mod">
+          <ac:chgData name="Are Mjaavatten" userId="00bb58f78e5d171c" providerId="LiveId" clId="{8CF42377-F741-4ADE-BEED-5EFC9A8DF0FB}" dt="2025-01-01T17:03:47.477" v="513" actId="108"/>
+          <ac:spMkLst>
+            <pc:docMk/>
+            <pc:sldMk cId="855437036" sldId="257"/>
+            <ac:spMk id="4" creationId="{DBEBE9F0-73BC-BF41-D3AC-FA3957F4A30F}"/>
+          </ac:spMkLst>
+        </pc:spChg>
+      </pc:sldChg>
+      <pc:sldChg chg="modSp mod">
+        <pc:chgData name="Are Mjaavatten" userId="00bb58f78e5d171c" providerId="LiveId" clId="{8CF42377-F741-4ADE-BEED-5EFC9A8DF0FB}" dt="2024-12-13T17:59:43.796" v="309"/>
+        <pc:sldMkLst>
+          <pc:docMk/>
+          <pc:sldMk cId="360236570" sldId="259"/>
+        </pc:sldMkLst>
+        <pc:spChg chg="mod">
+          <ac:chgData name="Are Mjaavatten" userId="00bb58f78e5d171c" providerId="LiveId" clId="{8CF42377-F741-4ADE-BEED-5EFC9A8DF0FB}" dt="2024-12-13T17:59:43.796" v="309"/>
+          <ac:spMkLst>
+            <pc:docMk/>
+            <pc:sldMk cId="360236570" sldId="259"/>
+            <ac:spMk id="3" creationId="{EB4D6777-D1FB-FA52-F6AF-67F4665F7DD9}"/>
+          </ac:spMkLst>
+        </pc:spChg>
+      </pc:sldChg>
+      <pc:sldChg chg="addSp delSp modSp mod">
+        <pc:chgData name="Are Mjaavatten" userId="00bb58f78e5d171c" providerId="LiveId" clId="{8CF42377-F741-4ADE-BEED-5EFC9A8DF0FB}" dt="2024-12-13T12:48:38.742" v="147" actId="1038"/>
+        <pc:sldMkLst>
+          <pc:docMk/>
+          <pc:sldMk cId="2324055941" sldId="292"/>
+        </pc:sldMkLst>
+        <pc:spChg chg="mod">
+          <ac:chgData name="Are Mjaavatten" userId="00bb58f78e5d171c" providerId="LiveId" clId="{8CF42377-F741-4ADE-BEED-5EFC9A8DF0FB}" dt="2024-12-13T12:48:38.742" v="147" actId="1038"/>
+          <ac:spMkLst>
+            <pc:docMk/>
+            <pc:sldMk cId="2324055941" sldId="292"/>
+            <ac:spMk id="9" creationId="{71E2011A-6411-D281-8C31-42CDB8C2C2B1}"/>
+          </ac:spMkLst>
+        </pc:spChg>
+        <pc:spChg chg="mod">
+          <ac:chgData name="Are Mjaavatten" userId="00bb58f78e5d171c" providerId="LiveId" clId="{8CF42377-F741-4ADE-BEED-5EFC9A8DF0FB}" dt="2024-12-13T12:48:27.700" v="138" actId="1037"/>
+          <ac:spMkLst>
+            <pc:docMk/>
+            <pc:sldMk cId="2324055941" sldId="292"/>
+            <ac:spMk id="16" creationId="{B7C652D4-8A1C-53A7-7DE6-94BA871903B3}"/>
+          </ac:spMkLst>
+        </pc:spChg>
+        <pc:spChg chg="mod">
+          <ac:chgData name="Are Mjaavatten" userId="00bb58f78e5d171c" providerId="LiveId" clId="{8CF42377-F741-4ADE-BEED-5EFC9A8DF0FB}" dt="2024-12-13T12:48:11.544" v="81" actId="1037"/>
+          <ac:spMkLst>
+            <pc:docMk/>
+            <pc:sldMk cId="2324055941" sldId="292"/>
+            <ac:spMk id="17" creationId="{9DFCE763-CF36-557C-1769-93EA11A1FF0E}"/>
+          </ac:spMkLst>
+        </pc:spChg>
+        <pc:picChg chg="add mod">
+          <ac:chgData name="Are Mjaavatten" userId="00bb58f78e5d171c" providerId="LiveId" clId="{8CF42377-F741-4ADE-BEED-5EFC9A8DF0FB}" dt="2024-12-13T12:47:52.692" v="60" actId="1037"/>
+          <ac:picMkLst>
+            <pc:docMk/>
+            <pc:sldMk cId="2324055941" sldId="292"/>
+            <ac:picMk id="6" creationId="{201299D0-A784-5AAC-CD78-C2754EE888EF}"/>
+          </ac:picMkLst>
+        </pc:picChg>
+      </pc:sldChg>
+      <pc:sldChg chg="addSp delSp modSp mod">
+        <pc:chgData name="Are Mjaavatten" userId="00bb58f78e5d171c" providerId="LiveId" clId="{8CF42377-F741-4ADE-BEED-5EFC9A8DF0FB}" dt="2025-01-01T17:06:51.962" v="524" actId="20577"/>
+        <pc:sldMkLst>
+          <pc:docMk/>
+          <pc:sldMk cId="3867845814" sldId="294"/>
+        </pc:sldMkLst>
+        <pc:spChg chg="mod">
+          <ac:chgData name="Are Mjaavatten" userId="00bb58f78e5d171c" providerId="LiveId" clId="{8CF42377-F741-4ADE-BEED-5EFC9A8DF0FB}" dt="2025-01-01T17:06:51.962" v="524" actId="20577"/>
+          <ac:spMkLst>
+            <pc:docMk/>
+            <pc:sldMk cId="3867845814" sldId="294"/>
+            <ac:spMk id="2" creationId="{8C26940D-E45C-FB43-F01B-A6E9F780F4BE}"/>
+          </ac:spMkLst>
+        </pc:spChg>
+        <pc:picChg chg="add mod">
+          <ac:chgData name="Are Mjaavatten" userId="00bb58f78e5d171c" providerId="LiveId" clId="{8CF42377-F741-4ADE-BEED-5EFC9A8DF0FB}" dt="2024-12-13T18:52:15.306" v="423" actId="1076"/>
+          <ac:picMkLst>
+            <pc:docMk/>
+            <pc:sldMk cId="3867845814" sldId="294"/>
+            <ac:picMk id="4" creationId="{717F5919-B66E-B1FE-D859-2FAF52FFE128}"/>
+          </ac:picMkLst>
+        </pc:picChg>
+      </pc:sldChg>
+      <pc:sldChg chg="modSp mod">
+        <pc:chgData name="Are Mjaavatten" userId="00bb58f78e5d171c" providerId="LiveId" clId="{8CF42377-F741-4ADE-BEED-5EFC9A8DF0FB}" dt="2025-01-01T17:05:30.625" v="515" actId="404"/>
+        <pc:sldMkLst>
+          <pc:docMk/>
+          <pc:sldMk cId="3349076888" sldId="305"/>
+        </pc:sldMkLst>
+        <pc:spChg chg="mod">
+          <ac:chgData name="Are Mjaavatten" userId="00bb58f78e5d171c" providerId="LiveId" clId="{8CF42377-F741-4ADE-BEED-5EFC9A8DF0FB}" dt="2025-01-01T17:05:30.625" v="515" actId="404"/>
+          <ac:spMkLst>
+            <pc:docMk/>
+            <pc:sldMk cId="3349076888" sldId="305"/>
+            <ac:spMk id="3" creationId="{908F9C8A-E071-33B6-2862-8BD117F8DFC8}"/>
+          </ac:spMkLst>
+        </pc:spChg>
+      </pc:sldChg>
+      <pc:sldChg chg="addSp modSp mod">
+        <pc:chgData name="Are Mjaavatten" userId="00bb58f78e5d171c" providerId="LiveId" clId="{8CF42377-F741-4ADE-BEED-5EFC9A8DF0FB}" dt="2024-12-13T13:02:54.125" v="287" actId="1076"/>
+        <pc:sldMkLst>
+          <pc:docMk/>
+          <pc:sldMk cId="1125584165" sldId="306"/>
+        </pc:sldMkLst>
+        <pc:spChg chg="mod">
+          <ac:chgData name="Are Mjaavatten" userId="00bb58f78e5d171c" providerId="LiveId" clId="{8CF42377-F741-4ADE-BEED-5EFC9A8DF0FB}" dt="2024-12-13T13:02:44.367" v="285" actId="20577"/>
+          <ac:spMkLst>
+            <pc:docMk/>
+            <pc:sldMk cId="1125584165" sldId="306"/>
+            <ac:spMk id="3" creationId="{5DC1704F-D1E3-3EE0-4E67-9DDC56750F53}"/>
+          </ac:spMkLst>
+        </pc:spChg>
+        <pc:picChg chg="add mod">
+          <ac:chgData name="Are Mjaavatten" userId="00bb58f78e5d171c" providerId="LiveId" clId="{8CF42377-F741-4ADE-BEED-5EFC9A8DF0FB}" dt="2024-12-13T13:02:54.125" v="287" actId="1076"/>
+          <ac:picMkLst>
+            <pc:docMk/>
+            <pc:sldMk cId="1125584165" sldId="306"/>
+            <ac:picMk id="5" creationId="{918C5822-2E17-03CC-F5FA-E4E0429F4185}"/>
+          </ac:picMkLst>
+        </pc:picChg>
+      </pc:sldChg>
+      <pc:sldChg chg="modSp mod">
+        <pc:chgData name="Are Mjaavatten" userId="00bb58f78e5d171c" providerId="LiveId" clId="{8CF42377-F741-4ADE-BEED-5EFC9A8DF0FB}" dt="2025-01-01T17:08:24.490" v="534" actId="255"/>
+        <pc:sldMkLst>
+          <pc:docMk/>
+          <pc:sldMk cId="4239519366" sldId="307"/>
+        </pc:sldMkLst>
+        <pc:spChg chg="mod">
+          <ac:chgData name="Are Mjaavatten" userId="00bb58f78e5d171c" providerId="LiveId" clId="{8CF42377-F741-4ADE-BEED-5EFC9A8DF0FB}" dt="2025-01-01T17:08:24.490" v="534" actId="255"/>
+          <ac:spMkLst>
+            <pc:docMk/>
+            <pc:sldMk cId="4239519366" sldId="307"/>
+            <ac:spMk id="2" creationId="{40717438-7D15-A4DF-59BD-7907A278FFFF}"/>
+          </ac:spMkLst>
+        </pc:spChg>
+      </pc:sldChg>
+      <pc:sldChg chg="modSp mod">
+        <pc:chgData name="Are Mjaavatten" userId="00bb58f78e5d171c" providerId="LiveId" clId="{8CF42377-F741-4ADE-BEED-5EFC9A8DF0FB}" dt="2025-01-05T14:43:40.801" v="594" actId="20577"/>
+        <pc:sldMkLst>
+          <pc:docMk/>
+          <pc:sldMk cId="3871533049" sldId="308"/>
+        </pc:sldMkLst>
+        <pc:spChg chg="mod">
+          <ac:chgData name="Are Mjaavatten" userId="00bb58f78e5d171c" providerId="LiveId" clId="{8CF42377-F741-4ADE-BEED-5EFC9A8DF0FB}" dt="2025-01-01T17:15:47.596" v="592" actId="20577"/>
+          <ac:spMkLst>
+            <pc:docMk/>
+            <pc:sldMk cId="3871533049" sldId="308"/>
+            <ac:spMk id="3" creationId="{D72D6259-E543-BD16-47E5-849274618303}"/>
+          </ac:spMkLst>
+        </pc:spChg>
+        <pc:spChg chg="mod">
+          <ac:chgData name="Are Mjaavatten" userId="00bb58f78e5d171c" providerId="LiveId" clId="{8CF42377-F741-4ADE-BEED-5EFC9A8DF0FB}" dt="2025-01-05T14:43:40.801" v="594" actId="20577"/>
+          <ac:spMkLst>
+            <pc:docMk/>
+            <pc:sldMk cId="3871533049" sldId="308"/>
+            <ac:spMk id="6" creationId="{66B720E1-9230-6E72-8E7C-77DD823C298A}"/>
+          </ac:spMkLst>
+        </pc:spChg>
+      </pc:sldChg>
+      <pc:sldChg chg="modSp mod">
+        <pc:chgData name="Are Mjaavatten" userId="00bb58f78e5d171c" providerId="LiveId" clId="{8CF42377-F741-4ADE-BEED-5EFC9A8DF0FB}" dt="2025-01-05T14:44:12.836" v="596" actId="20577"/>
+        <pc:sldMkLst>
+          <pc:docMk/>
+          <pc:sldMk cId="2752067575" sldId="309"/>
+        </pc:sldMkLst>
+        <pc:spChg chg="mod">
+          <ac:chgData name="Are Mjaavatten" userId="00bb58f78e5d171c" providerId="LiveId" clId="{8CF42377-F741-4ADE-BEED-5EFC9A8DF0FB}" dt="2025-01-05T14:44:12.836" v="596" actId="20577"/>
+          <ac:spMkLst>
+            <pc:docMk/>
+            <pc:sldMk cId="2752067575" sldId="309"/>
+            <ac:spMk id="3" creationId="{1B67D92C-BA49-C035-17A3-6AF45CCE60AA}"/>
+          </ac:spMkLst>
+        </pc:spChg>
+      </pc:sldChg>
+      <pc:sldChg chg="modSp mod">
+        <pc:chgData name="Are Mjaavatten" userId="00bb58f78e5d171c" providerId="LiveId" clId="{8CF42377-F741-4ADE-BEED-5EFC9A8DF0FB}" dt="2025-01-05T14:47:13.758" v="633" actId="21"/>
+        <pc:sldMkLst>
+          <pc:docMk/>
+          <pc:sldMk cId="4137571960" sldId="310"/>
+        </pc:sldMkLst>
+        <pc:spChg chg="mod">
+          <ac:chgData name="Are Mjaavatten" userId="00bb58f78e5d171c" providerId="LiveId" clId="{8CF42377-F741-4ADE-BEED-5EFC9A8DF0FB}" dt="2025-01-05T14:47:13.758" v="633" actId="21"/>
+          <ac:spMkLst>
+            <pc:docMk/>
+            <pc:sldMk cId="4137571960" sldId="310"/>
+            <ac:spMk id="3" creationId="{8F61E339-ABCB-C456-57BD-00B8BF18FD59}"/>
+          </ac:spMkLst>
+        </pc:spChg>
+      </pc:sldChg>
+      <pc:sldChg chg="ord">
+        <pc:chgData name="Are Mjaavatten" userId="00bb58f78e5d171c" providerId="LiveId" clId="{8CF42377-F741-4ADE-BEED-5EFC9A8DF0FB}" dt="2024-12-13T12:50:26.161" v="149"/>
+        <pc:sldMkLst>
+          <pc:docMk/>
+          <pc:sldMk cId="2035280032" sldId="315"/>
+        </pc:sldMkLst>
+      </pc:sldChg>
+      <pc:sldChg chg="modSp new mod ord">
+        <pc:chgData name="Are Mjaavatten" userId="00bb58f78e5d171c" providerId="LiveId" clId="{8CF42377-F741-4ADE-BEED-5EFC9A8DF0FB}" dt="2025-01-01T17:06:21.264" v="517"/>
+        <pc:sldMkLst>
+          <pc:docMk/>
+          <pc:sldMk cId="3628613843" sldId="318"/>
+        </pc:sldMkLst>
+        <pc:spChg chg="mod">
+          <ac:chgData name="Are Mjaavatten" userId="00bb58f78e5d171c" providerId="LiveId" clId="{8CF42377-F741-4ADE-BEED-5EFC9A8DF0FB}" dt="2024-12-13T18:41:54.435" v="333" actId="20577"/>
+          <ac:spMkLst>
+            <pc:docMk/>
+            <pc:sldMk cId="3628613843" sldId="318"/>
+            <ac:spMk id="2" creationId="{F3BCD982-D8D4-97B6-6AB9-E644B003D527}"/>
+          </ac:spMkLst>
+        </pc:spChg>
+        <pc:spChg chg="mod">
+          <ac:chgData name="Are Mjaavatten" userId="00bb58f78e5d171c" providerId="LiveId" clId="{8CF42377-F741-4ADE-BEED-5EFC9A8DF0FB}" dt="2024-12-13T18:44:30.238" v="420" actId="20577"/>
+          <ac:spMkLst>
+            <pc:docMk/>
+            <pc:sldMk cId="3628613843" sldId="318"/>
+            <ac:spMk id="3" creationId="{2FB49A49-3644-0AB1-3231-77D6C8458ABB}"/>
+          </ac:spMkLst>
+        </pc:spChg>
+      </pc:sldChg>
+      <pc:sldChg chg="new del">
+        <pc:chgData name="Are Mjaavatten" userId="00bb58f78e5d171c" providerId="LiveId" clId="{8CF42377-F741-4ADE-BEED-5EFC9A8DF0FB}" dt="2025-01-01T16:55:22.125" v="441" actId="680"/>
+        <pc:sldMkLst>
+          <pc:docMk/>
+          <pc:sldMk cId="789667488" sldId="319"/>
+        </pc:sldMkLst>
+      </pc:sldChg>
+      <pc:sldChg chg="addSp delSp modSp new mod modClrScheme chgLayout">
+        <pc:chgData name="Are Mjaavatten" userId="00bb58f78e5d171c" providerId="LiveId" clId="{8CF42377-F741-4ADE-BEED-5EFC9A8DF0FB}" dt="2025-01-05T14:53:01.061" v="967" actId="20577"/>
+        <pc:sldMkLst>
+          <pc:docMk/>
+          <pc:sldMk cId="3502236513" sldId="319"/>
+        </pc:sldMkLst>
+        <pc:spChg chg="del mod">
+          <ac:chgData name="Are Mjaavatten" userId="00bb58f78e5d171c" providerId="LiveId" clId="{8CF42377-F741-4ADE-BEED-5EFC9A8DF0FB}" dt="2025-01-05T14:50:13.376" v="812" actId="478"/>
+          <ac:spMkLst>
+            <pc:docMk/>
+            <pc:sldMk cId="3502236513" sldId="319"/>
+            <ac:spMk id="2" creationId="{CA39530F-5890-CF48-1D33-76416511F027}"/>
+          </ac:spMkLst>
+        </pc:spChg>
+        <pc:spChg chg="mod ord">
+          <ac:chgData name="Are Mjaavatten" userId="00bb58f78e5d171c" providerId="LiveId" clId="{8CF42377-F741-4ADE-BEED-5EFC9A8DF0FB}" dt="2025-01-05T14:53:01.061" v="967" actId="20577"/>
+          <ac:spMkLst>
+            <pc:docMk/>
+            <pc:sldMk cId="3502236513" sldId="319"/>
+            <ac:spMk id="3" creationId="{0F4E9085-97F2-BA5B-A0E0-8543D8874BFC}"/>
+          </ac:spMkLst>
+        </pc:spChg>
+        <pc:spChg chg="add del mod">
+          <ac:chgData name="Are Mjaavatten" userId="00bb58f78e5d171c" providerId="LiveId" clId="{8CF42377-F741-4ADE-BEED-5EFC9A8DF0FB}" dt="2025-01-05T14:50:28.437" v="813" actId="700"/>
+          <ac:spMkLst>
+            <pc:docMk/>
+            <pc:sldMk cId="3502236513" sldId="319"/>
+            <ac:spMk id="5" creationId="{7DF1B60E-0A55-20F1-667B-96AA063C3C8E}"/>
+          </ac:spMkLst>
+        </pc:spChg>
+      </pc:sldChg>
+    </pc:docChg>
+  </pc:docChgLst>
+</pc:chgInfo>
+</file>
+
 <file path=ppt/notesMasters/notesMaster1.xml><?xml version="1.0" encoding="utf-8"?>
 <p:notesMaster xmlns:a="http://schemas.openxmlformats.org/drawingml/2006/main" xmlns:r="http://schemas.openxmlformats.org/officeDocument/2006/relationships" xmlns:p="http://schemas.openxmlformats.org/presentationml/2006/main">
   <p:cSld>
@@ -215,7 +513,7 @@
           <a:p>
             <a:fld id="{598DDF7D-A1D3-4059-A0FB-793351DB4C1D}" type="datetimeFigureOut">
               <a:rPr lang="en-GB" smtClean="0"/>
-              <a:t>11/12/2024</a:t>
+              <a:t>05/01/2025</a:t>
             </a:fld>
             <a:endParaRPr lang="en-GB"/>
           </a:p>
@@ -548,7 +846,7 @@
           <a:p>
             <a:fld id="{69594EBF-30A6-4665-92F6-CD521344A0DA}" type="slidenum">
               <a:rPr lang="en-GB" smtClean="0"/>
-              <a:t>12</a:t>
+              <a:t>6</a:t>
             </a:fld>
             <a:endParaRPr lang="en-GB"/>
           </a:p>
@@ -557,7 +855,7 @@
     </p:spTree>
     <p:extLst>
       <p:ext uri="{BB962C8B-B14F-4D97-AF65-F5344CB8AC3E}">
-        <p14:creationId xmlns:p14="http://schemas.microsoft.com/office/powerpoint/2010/main" val="2715837667"/>
+        <p14:creationId xmlns:p14="http://schemas.microsoft.com/office/powerpoint/2010/main" val="546405172"/>
       </p:ext>
     </p:extLst>
   </p:cSld>
@@ -611,10 +909,7 @@
           <a:bodyPr/>
           <a:lstStyle/>
           <a:p>
-            <a:r>
-              <a:rPr lang="en-GB" dirty="0"/>
-              <a:t>Remove end: Files(1): 20230721/KC.txt  Remove rip: 20230721/gA.txt (files(2))</a:t>
-            </a:r>
+            <a:endParaRPr lang="en-GB" dirty="0"/>
           </a:p>
         </p:txBody>
       </p:sp>
@@ -635,7 +930,7 @@
           <a:p>
             <a:fld id="{69594EBF-30A6-4665-92F6-CD521344A0DA}" type="slidenum">
               <a:rPr lang="en-GB" smtClean="0"/>
-              <a:t>14</a:t>
+              <a:t>12</a:t>
             </a:fld>
             <a:endParaRPr lang="en-GB"/>
           </a:p>
@@ -644,7 +939,7 @@
     </p:spTree>
     <p:extLst>
       <p:ext uri="{BB962C8B-B14F-4D97-AF65-F5344CB8AC3E}">
-        <p14:creationId xmlns:p14="http://schemas.microsoft.com/office/powerpoint/2010/main" val="421989368"/>
+        <p14:creationId xmlns:p14="http://schemas.microsoft.com/office/powerpoint/2010/main" val="2715837667"/>
       </p:ext>
     </p:extLst>
   </p:cSld>
@@ -700,7 +995,7 @@
           <a:p>
             <a:r>
               <a:rPr lang="en-GB" dirty="0"/>
-              <a:t>20230724/qA.txt . Files(5)</a:t>
+              <a:t>Remove end: Files(1): 20230721/KC.txt  Remove rip: 20230721/gA.txt (files(2))</a:t>
             </a:r>
           </a:p>
         </p:txBody>
@@ -722,7 +1017,7 @@
           <a:p>
             <a:fld id="{69594EBF-30A6-4665-92F6-CD521344A0DA}" type="slidenum">
               <a:rPr lang="en-GB" smtClean="0"/>
-              <a:t>15</a:t>
+              <a:t>14</a:t>
             </a:fld>
             <a:endParaRPr lang="en-GB"/>
           </a:p>
@@ -731,7 +1026,7 @@
     </p:spTree>
     <p:extLst>
       <p:ext uri="{BB962C8B-B14F-4D97-AF65-F5344CB8AC3E}">
-        <p14:creationId xmlns:p14="http://schemas.microsoft.com/office/powerpoint/2010/main" val="2647376465"/>
+        <p14:creationId xmlns:p14="http://schemas.microsoft.com/office/powerpoint/2010/main" val="421989368"/>
       </p:ext>
     </p:extLst>
   </p:cSld>
@@ -785,7 +1080,10 @@
           <a:bodyPr/>
           <a:lstStyle/>
           <a:p>
-            <a:endParaRPr lang="en-GB" dirty="0"/>
+            <a:r>
+              <a:rPr lang="en-GB" dirty="0"/>
+              <a:t>20230724/qA.txt . Files(5)</a:t>
+            </a:r>
           </a:p>
         </p:txBody>
       </p:sp>
@@ -806,7 +1104,7 @@
           <a:p>
             <a:fld id="{69594EBF-30A6-4665-92F6-CD521344A0DA}" type="slidenum">
               <a:rPr lang="en-GB" smtClean="0"/>
-              <a:t>16</a:t>
+              <a:t>15</a:t>
             </a:fld>
             <a:endParaRPr lang="en-GB"/>
           </a:p>
@@ -815,7 +1113,7 @@
     </p:spTree>
     <p:extLst>
       <p:ext uri="{BB962C8B-B14F-4D97-AF65-F5344CB8AC3E}">
-        <p14:creationId xmlns:p14="http://schemas.microsoft.com/office/powerpoint/2010/main" val="2209784493"/>
+        <p14:creationId xmlns:p14="http://schemas.microsoft.com/office/powerpoint/2010/main" val="2647376465"/>
       </p:ext>
     </p:extLst>
   </p:cSld>
@@ -890,7 +1188,91 @@
           <a:p>
             <a:fld id="{69594EBF-30A6-4665-92F6-CD521344A0DA}" type="slidenum">
               <a:rPr lang="en-GB" smtClean="0"/>
-              <a:t>19</a:t>
+              <a:t>17</a:t>
+            </a:fld>
+            <a:endParaRPr lang="en-GB"/>
+          </a:p>
+        </p:txBody>
+      </p:sp>
+    </p:spTree>
+    <p:extLst>
+      <p:ext uri="{BB962C8B-B14F-4D97-AF65-F5344CB8AC3E}">
+        <p14:creationId xmlns:p14="http://schemas.microsoft.com/office/powerpoint/2010/main" val="2209784493"/>
+      </p:ext>
+    </p:extLst>
+  </p:cSld>
+  <p:clrMapOvr>
+    <a:masterClrMapping/>
+  </p:clrMapOvr>
+</p:notes>
+</file>
+
+<file path=ppt/notesSlides/notesSlide6.xml><?xml version="1.0" encoding="utf-8"?>
+<p:notes xmlns:a="http://schemas.openxmlformats.org/drawingml/2006/main" xmlns:r="http://schemas.openxmlformats.org/officeDocument/2006/relationships" xmlns:p="http://schemas.openxmlformats.org/presentationml/2006/main">
+  <p:cSld>
+    <p:spTree>
+      <p:nvGrpSpPr>
+        <p:cNvPr id="1" name=""/>
+        <p:cNvGrpSpPr/>
+        <p:nvPr/>
+      </p:nvGrpSpPr>
+      <p:grpSpPr>
+        <a:xfrm>
+          <a:off x="0" y="0"/>
+          <a:ext cx="0" cy="0"/>
+          <a:chOff x="0" y="0"/>
+          <a:chExt cx="0" cy="0"/>
+        </a:xfrm>
+      </p:grpSpPr>
+      <p:sp>
+        <p:nvSpPr>
+          <p:cNvPr id="2" name="Slide Image Placeholder 1"/>
+          <p:cNvSpPr>
+            <a:spLocks noGrp="1" noRot="1" noChangeAspect="1"/>
+          </p:cNvSpPr>
+          <p:nvPr>
+            <p:ph type="sldImg"/>
+          </p:nvPr>
+        </p:nvSpPr>
+        <p:spPr/>
+      </p:sp>
+      <p:sp>
+        <p:nvSpPr>
+          <p:cNvPr id="3" name="Notes Placeholder 2"/>
+          <p:cNvSpPr>
+            <a:spLocks noGrp="1"/>
+          </p:cNvSpPr>
+          <p:nvPr>
+            <p:ph type="body" idx="1"/>
+          </p:nvPr>
+        </p:nvSpPr>
+        <p:spPr/>
+        <p:txBody>
+          <a:bodyPr/>
+          <a:lstStyle/>
+          <a:p>
+            <a:endParaRPr lang="en-GB" dirty="0"/>
+          </a:p>
+        </p:txBody>
+      </p:sp>
+      <p:sp>
+        <p:nvSpPr>
+          <p:cNvPr id="4" name="Slide Number Placeholder 3"/>
+          <p:cNvSpPr>
+            <a:spLocks noGrp="1"/>
+          </p:cNvSpPr>
+          <p:nvPr>
+            <p:ph type="sldNum" sz="quarter" idx="5"/>
+          </p:nvPr>
+        </p:nvSpPr>
+        <p:spPr/>
+        <p:txBody>
+          <a:bodyPr/>
+          <a:lstStyle/>
+          <a:p>
+            <a:fld id="{69594EBF-30A6-4665-92F6-CD521344A0DA}" type="slidenum">
+              <a:rPr lang="en-GB" smtClean="0"/>
+              <a:t>20</a:t>
             </a:fld>
             <a:endParaRPr lang="en-GB"/>
           </a:p>
@@ -1058,7 +1440,7 @@
           <a:p>
             <a:fld id="{8E581E4C-4D70-454A-94D1-5E3EF1AF87C6}" type="datetimeFigureOut">
               <a:rPr lang="en-GB" smtClean="0"/>
-              <a:t>11/12/2024</a:t>
+              <a:t>05/01/2025</a:t>
             </a:fld>
             <a:endParaRPr lang="en-GB"/>
           </a:p>
@@ -1258,7 +1640,7 @@
           <a:p>
             <a:fld id="{8E581E4C-4D70-454A-94D1-5E3EF1AF87C6}" type="datetimeFigureOut">
               <a:rPr lang="en-GB" smtClean="0"/>
-              <a:t>11/12/2024</a:t>
+              <a:t>05/01/2025</a:t>
             </a:fld>
             <a:endParaRPr lang="en-GB"/>
           </a:p>
@@ -1468,7 +1850,7 @@
           <a:p>
             <a:fld id="{8E581E4C-4D70-454A-94D1-5E3EF1AF87C6}" type="datetimeFigureOut">
               <a:rPr lang="en-GB" smtClean="0"/>
-              <a:t>11/12/2024</a:t>
+              <a:t>05/01/2025</a:t>
             </a:fld>
             <a:endParaRPr lang="en-GB"/>
           </a:p>
@@ -1668,7 +2050,7 @@
           <a:p>
             <a:fld id="{8E581E4C-4D70-454A-94D1-5E3EF1AF87C6}" type="datetimeFigureOut">
               <a:rPr lang="en-GB" smtClean="0"/>
-              <a:t>11/12/2024</a:t>
+              <a:t>05/01/2025</a:t>
             </a:fld>
             <a:endParaRPr lang="en-GB"/>
           </a:p>
@@ -1944,7 +2326,7 @@
           <a:p>
             <a:fld id="{8E581E4C-4D70-454A-94D1-5E3EF1AF87C6}" type="datetimeFigureOut">
               <a:rPr lang="en-GB" smtClean="0"/>
-              <a:t>11/12/2024</a:t>
+              <a:t>05/01/2025</a:t>
             </a:fld>
             <a:endParaRPr lang="en-GB"/>
           </a:p>
@@ -2212,7 +2594,7 @@
           <a:p>
             <a:fld id="{8E581E4C-4D70-454A-94D1-5E3EF1AF87C6}" type="datetimeFigureOut">
               <a:rPr lang="en-GB" smtClean="0"/>
-              <a:t>11/12/2024</a:t>
+              <a:t>05/01/2025</a:t>
             </a:fld>
             <a:endParaRPr lang="en-GB"/>
           </a:p>
@@ -2627,7 +3009,7 @@
           <a:p>
             <a:fld id="{8E581E4C-4D70-454A-94D1-5E3EF1AF87C6}" type="datetimeFigureOut">
               <a:rPr lang="en-GB" smtClean="0"/>
-              <a:t>11/12/2024</a:t>
+              <a:t>05/01/2025</a:t>
             </a:fld>
             <a:endParaRPr lang="en-GB"/>
           </a:p>
@@ -2769,7 +3151,7 @@
           <a:p>
             <a:fld id="{8E581E4C-4D70-454A-94D1-5E3EF1AF87C6}" type="datetimeFigureOut">
               <a:rPr lang="en-GB" smtClean="0"/>
-              <a:t>11/12/2024</a:t>
+              <a:t>05/01/2025</a:t>
             </a:fld>
             <a:endParaRPr lang="en-GB"/>
           </a:p>
@@ -2882,7 +3264,7 @@
           <a:p>
             <a:fld id="{8E581E4C-4D70-454A-94D1-5E3EF1AF87C6}" type="datetimeFigureOut">
               <a:rPr lang="en-GB" smtClean="0"/>
-              <a:t>11/12/2024</a:t>
+              <a:t>05/01/2025</a:t>
             </a:fld>
             <a:endParaRPr lang="en-GB"/>
           </a:p>
@@ -3195,7 +3577,7 @@
           <a:p>
             <a:fld id="{8E581E4C-4D70-454A-94D1-5E3EF1AF87C6}" type="datetimeFigureOut">
               <a:rPr lang="en-GB" smtClean="0"/>
-              <a:t>11/12/2024</a:t>
+              <a:t>05/01/2025</a:t>
             </a:fld>
             <a:endParaRPr lang="en-GB"/>
           </a:p>
@@ -3484,7 +3866,7 @@
           <a:p>
             <a:fld id="{8E581E4C-4D70-454A-94D1-5E3EF1AF87C6}" type="datetimeFigureOut">
               <a:rPr lang="en-GB" smtClean="0"/>
-              <a:t>11/12/2024</a:t>
+              <a:t>05/01/2025</a:t>
             </a:fld>
             <a:endParaRPr lang="en-GB"/>
           </a:p>
@@ -3727,7 +4109,7 @@
           <a:p>
             <a:fld id="{8E581E4C-4D70-454A-94D1-5E3EF1AF87C6}" type="datetimeFigureOut">
               <a:rPr lang="en-GB" smtClean="0"/>
-              <a:t>11/12/2024</a:t>
+              <a:t>05/01/2025</a:t>
             </a:fld>
             <a:endParaRPr lang="en-GB"/>
           </a:p>
@@ -4258,7 +4640,7 @@
             </a:br>
             <a:r>
               <a:rPr lang="en-GB" dirty="0"/>
-              <a:t>Exercise 1 B  Δx and force shift</a:t>
+              <a:t>Exercise 1 C:  Δx and force shift</a:t>
             </a:r>
             <a:br>
               <a:rPr lang="en-GB" dirty="0"/>
@@ -4372,10 +4754,10 @@
       </p:sp>
       <p:pic>
         <p:nvPicPr>
-          <p:cNvPr id="5" name="Picture 4">
-            <a:extLst>
-              <a:ext uri="{FF2B5EF4-FFF2-40B4-BE49-F238E27FC236}">
-                <a16:creationId xmlns:a16="http://schemas.microsoft.com/office/drawing/2014/main" id="{922F9D7D-1EC5-198E-4AB5-9F2FCDD14F3C}"/>
+          <p:cNvPr id="4" name="Picture 3">
+            <a:extLst>
+              <a:ext uri="{FF2B5EF4-FFF2-40B4-BE49-F238E27FC236}">
+                <a16:creationId xmlns:a16="http://schemas.microsoft.com/office/drawing/2014/main" id="{717F5919-B66E-B1FE-D859-2FAF52FFE128}"/>
               </a:ext>
             </a:extLst>
           </p:cNvPr>
@@ -4392,8 +4774,8 @@
         </p:blipFill>
         <p:spPr>
           <a:xfrm>
-            <a:off x="4748002" y="2844909"/>
-            <a:ext cx="447695" cy="402926"/>
+            <a:off x="4803792" y="2740068"/>
+            <a:ext cx="276264" cy="352474"/>
           </a:xfrm>
           <a:prstGeom prst="rect">
             <a:avLst/>
@@ -4448,19 +4830,14 @@
         </p:nvSpPr>
         <p:spPr/>
         <p:txBody>
-          <a:bodyPr/>
-          <a:lstStyle/>
-          <a:p>
-            <a:r>
-              <a:rPr lang="en-GB" dirty="0"/>
-              <a:t>Exercise 1 C</a:t>
-            </a:r>
-            <a:br>
-              <a:rPr lang="en-GB" dirty="0"/>
-            </a:br>
-            <a:r>
-              <a:rPr lang="en-GB" sz="3200" dirty="0"/>
-              <a:t>Matlab tables</a:t>
+          <a:bodyPr>
+            <a:normAutofit/>
+          </a:bodyPr>
+          <a:lstStyle/>
+          <a:p>
+            <a:r>
+              <a:rPr lang="en-GB" sz="4000" dirty="0"/>
+              <a:t>Exercise 1 D: Matlab tables</a:t>
             </a:r>
           </a:p>
         </p:txBody>
@@ -4588,55 +4965,50 @@
           </a:xfrm>
         </p:spPr>
         <p:txBody>
-          <a:bodyPr/>
-          <a:lstStyle/>
-          <a:p>
-            <a:r>
-              <a:rPr lang="en-GB" dirty="0"/>
-              <a:t>Start the app by right-clicking </a:t>
-            </a:r>
-            <a:r>
-              <a:rPr lang="en-GB" sz="2400" dirty="0" err="1">
+          <a:bodyPr>
+            <a:normAutofit/>
+          </a:bodyPr>
+          <a:lstStyle/>
+          <a:p>
+            <a:r>
+              <a:rPr lang="en-GB" dirty="0"/>
+              <a:t>You can start the app from </a:t>
+            </a:r>
+            <a:r>
+              <a:rPr lang="en-GB" dirty="0" err="1"/>
+              <a:t>Matlab’s</a:t>
+            </a:r>
+            <a:r>
+              <a:rPr lang="en-GB" dirty="0"/>
+              <a:t> Command window</a:t>
+            </a:r>
+          </a:p>
+          <a:p>
+            <a:pPr lvl="1"/>
+            <a:r>
+              <a:rPr lang="en-GB" dirty="0"/>
+              <a:t>Simply type</a:t>
+            </a:r>
+          </a:p>
+          <a:p>
+            <a:pPr marL="457200" lvl="1" indent="0">
+              <a:buNone/>
+            </a:pPr>
+            <a:r>
+              <a:rPr lang="en-GB" dirty="0">
                 <a:latin typeface="Consolas" panose="020B0609020204030204" pitchFamily="49" charset="0"/>
               </a:rPr>
-              <a:t>RipAnalysis.mlapp</a:t>
-            </a:r>
-            <a:r>
-              <a:rPr lang="en-GB" sz="2400" dirty="0">
+              <a:t>	</a:t>
+            </a:r>
+            <a:r>
+              <a:rPr lang="en-GB" dirty="0" err="1">
                 <a:latin typeface="Consolas" panose="020B0609020204030204" pitchFamily="49" charset="0"/>
               </a:rPr>
-              <a:t> </a:t>
-            </a:r>
-            <a:endParaRPr lang="en-GB" dirty="0"/>
-          </a:p>
-          <a:p>
-            <a:pPr lvl="1"/>
-            <a:r>
-              <a:rPr lang="en-GB" dirty="0"/>
-              <a:t>Within Matlab: select</a:t>
-            </a:r>
-            <a:r>
-              <a:rPr lang="en-GB" sz="2000" dirty="0">
-                <a:latin typeface="Consolas" panose="020B0609020204030204" pitchFamily="49" charset="0"/>
-              </a:rPr>
-              <a:t> Run</a:t>
-            </a:r>
-          </a:p>
-          <a:p>
-            <a:pPr lvl="1"/>
-            <a:r>
-              <a:rPr lang="en-GB" dirty="0"/>
-              <a:t>In File Explorer or equivalent: select Open</a:t>
-            </a:r>
-            <a:endParaRPr lang="en-GB" sz="2400" dirty="0">
+              <a:t>RipAnalysis</a:t>
+            </a:r>
+            <a:endParaRPr lang="en-GB" dirty="0">
               <a:latin typeface="Consolas" panose="020B0609020204030204" pitchFamily="49" charset="0"/>
             </a:endParaRPr>
-          </a:p>
-          <a:p>
-            <a:pPr marL="0" indent="0">
-              <a:buNone/>
-            </a:pPr>
-            <a:endParaRPr lang="en-GB" dirty="0"/>
           </a:p>
           <a:p>
             <a:endParaRPr lang="en-GB" dirty="0"/>
@@ -4727,7 +5099,7 @@
             </a:pPr>
             <a:r>
               <a:rPr lang="en-GB" sz="2400" dirty="0"/>
-              <a:t>The data file name may contain subfolder name</a:t>
+              <a:t>The data file name may contain a subfolder name</a:t>
             </a:r>
           </a:p>
           <a:p>
@@ -4978,7 +5350,7 @@
           <a:p>
             <a:r>
               <a:rPr lang="en-GB" dirty="0"/>
-              <a:t>Remove any disturbing data at start of end by clicking the Start or End buttons and use the crosshairs to specify new limits.</a:t>
+              <a:t>Remove any disturbing data at start or end by clicking the Start or End buttons and use the crosshairs to specify new limits.</a:t>
             </a:r>
           </a:p>
           <a:p>
@@ -5090,7 +5462,7 @@
         <p:spPr/>
         <p:txBody>
           <a:bodyPr>
-            <a:normAutofit lnSpcReduction="10000"/>
+            <a:normAutofit/>
           </a:bodyPr>
           <a:lstStyle/>
           <a:p>
@@ -5122,46 +5494,6 @@
             <a:r>
               <a:rPr lang="en-GB" sz="2400" dirty="0"/>
               <a:t>Click the Save button again</a:t>
-            </a:r>
-          </a:p>
-          <a:p>
-            <a:r>
-              <a:rPr lang="en-GB" sz="2400" dirty="0"/>
-              <a:t>Reload the original file</a:t>
-            </a:r>
-          </a:p>
-          <a:p>
-            <a:pPr lvl="1"/>
-            <a:r>
-              <a:rPr lang="en-GB" sz="2000" dirty="0"/>
-              <a:t>Mark the file name in the file name text box</a:t>
-            </a:r>
-          </a:p>
-          <a:p>
-            <a:pPr lvl="1"/>
-            <a:r>
-              <a:rPr lang="en-GB" sz="2000" dirty="0"/>
-              <a:t>Cut the file name (ctrl-x on Windows)</a:t>
-            </a:r>
-          </a:p>
-          <a:p>
-            <a:pPr lvl="1"/>
-            <a:r>
-              <a:rPr lang="en-GB" sz="2000" dirty="0"/>
-              <a:t>Click somewhere outside the text box to let Matlab register the change</a:t>
-            </a:r>
-          </a:p>
-          <a:p>
-            <a:pPr lvl="1"/>
-            <a:r>
-              <a:rPr lang="en-GB" sz="2000" dirty="0"/>
-              <a:t>Paste the file name back and click outside the text box</a:t>
-            </a:r>
-          </a:p>
-          <a:p>
-            <a:r>
-              <a:rPr lang="en-GB" sz="2400" dirty="0"/>
-              <a:t>Click “Recall saved changes”</a:t>
             </a:r>
           </a:p>
           <a:p>
@@ -5201,177 +5533,97 @@
       </p:grpSpPr>
       <p:sp>
         <p:nvSpPr>
-          <p:cNvPr id="2" name="Title 1">
-            <a:extLst>
-              <a:ext uri="{FF2B5EF4-FFF2-40B4-BE49-F238E27FC236}">
-                <a16:creationId xmlns:a16="http://schemas.microsoft.com/office/drawing/2014/main" id="{D084B315-DB83-79C9-913F-45B087E1D832}"/>
-              </a:ext>
-            </a:extLst>
-          </p:cNvPr>
-          <p:cNvSpPr>
-            <a:spLocks noGrp="1"/>
-          </p:cNvSpPr>
-          <p:nvPr>
-            <p:ph type="title"/>
-          </p:nvPr>
-        </p:nvSpPr>
-        <p:spPr/>
+          <p:cNvPr id="3" name="Content Placeholder 2">
+            <a:extLst>
+              <a:ext uri="{FF2B5EF4-FFF2-40B4-BE49-F238E27FC236}">
+                <a16:creationId xmlns:a16="http://schemas.microsoft.com/office/drawing/2014/main" id="{0F4E9085-97F2-BA5B-A0E0-8543D8874BFC}"/>
+              </a:ext>
+            </a:extLst>
+          </p:cNvPr>
+          <p:cNvSpPr>
+            <a:spLocks noGrp="1"/>
+          </p:cNvSpPr>
+          <p:nvPr>
+            <p:ph idx="4294967295"/>
+          </p:nvPr>
+        </p:nvSpPr>
+        <p:spPr>
+          <a:xfrm>
+            <a:off x="0" y="641445"/>
+            <a:ext cx="10515600" cy="5535518"/>
+          </a:xfrm>
+        </p:spPr>
         <p:txBody>
           <a:bodyPr/>
           <a:lstStyle/>
           <a:p>
             <a:r>
-              <a:rPr lang="en-GB" dirty="0"/>
-              <a:t>Exercise 3: Preparations</a:t>
-            </a:r>
-          </a:p>
-        </p:txBody>
-      </p:sp>
-      <p:sp>
-        <p:nvSpPr>
-          <p:cNvPr id="3" name="Content Placeholder 2">
-            <a:extLst>
-              <a:ext uri="{FF2B5EF4-FFF2-40B4-BE49-F238E27FC236}">
-                <a16:creationId xmlns:a16="http://schemas.microsoft.com/office/drawing/2014/main" id="{6DE37DAA-137B-1D5F-4AC9-4C8B37F15903}"/>
-              </a:ext>
-            </a:extLst>
-          </p:cNvPr>
-          <p:cNvSpPr>
-            <a:spLocks noGrp="1"/>
-          </p:cNvSpPr>
-          <p:nvPr>
-            <p:ph idx="1"/>
-          </p:nvPr>
-        </p:nvSpPr>
-        <p:spPr/>
-        <p:txBody>
-          <a:bodyPr>
-            <a:normAutofit lnSpcReduction="10000"/>
-          </a:bodyPr>
-          <a:lstStyle/>
-          <a:p>
-            <a:r>
-              <a:rPr lang="en-GB" dirty="0"/>
-              <a:t>In order to have enough data to work with, copy the contents of Summer school 2024/Testdata.zip to your </a:t>
-            </a:r>
-            <a:r>
-              <a:rPr lang="en-GB" dirty="0" err="1"/>
-              <a:t>Datafolder</a:t>
-            </a:r>
+              <a:rPr lang="en-GB" sz="2400" dirty="0"/>
+              <a:t>Restore the original data</a:t>
+            </a:r>
+          </a:p>
+          <a:p>
+            <a:pPr lvl="1"/>
+            <a:r>
+              <a:rPr lang="en-GB" sz="2000" dirty="0"/>
+              <a:t>Mark and cut the file name in the file name text box (ctrl-x on Windows)</a:t>
+            </a:r>
+          </a:p>
+          <a:p>
+            <a:pPr lvl="1"/>
+            <a:r>
+              <a:rPr lang="en-GB" sz="2000" dirty="0"/>
+              <a:t>Click somewhere outside the text box to let Matlab register the change</a:t>
+            </a:r>
+          </a:p>
+          <a:p>
+            <a:pPr lvl="1"/>
+            <a:r>
+              <a:rPr lang="en-GB" sz="2000" dirty="0"/>
+              <a:t>Paste the file name back and click outside the text box</a:t>
+            </a:r>
+          </a:p>
+          <a:p>
+            <a:r>
+              <a:rPr lang="en-GB" sz="2400" dirty="0"/>
+              <a:t>You will now see the original graph without your corrections</a:t>
+            </a:r>
+          </a:p>
+          <a:p>
+            <a:endParaRPr lang="en-GB" sz="2400"/>
+          </a:p>
+          <a:p>
+            <a:endParaRPr lang="en-GB" sz="2400" dirty="0"/>
+          </a:p>
+          <a:p>
+            <a:r>
+              <a:rPr lang="en-GB" sz="2400" dirty="0"/>
+              <a:t>Restore your changes</a:t>
+            </a:r>
+          </a:p>
+          <a:p>
+            <a:pPr lvl="1"/>
+            <a:r>
+              <a:rPr lang="en-GB" sz="2000" dirty="0"/>
+              <a:t>The changes you made and stored are still available</a:t>
+            </a:r>
+          </a:p>
+          <a:p>
+            <a:pPr lvl="1"/>
+            <a:r>
+              <a:rPr lang="en-GB" sz="2000" dirty="0"/>
+              <a:t>Click “Recall saved changes” to retore your changes</a:t>
+            </a:r>
+          </a:p>
+          <a:p>
             <a:endParaRPr lang="en-GB" dirty="0"/>
-          </a:p>
-          <a:p>
-            <a:r>
-              <a:rPr lang="en-GB" dirty="0"/>
-              <a:t>In Matlab:</a:t>
-            </a:r>
-            <a:br>
-              <a:rPr lang="en-GB" dirty="0"/>
-            </a:br>
-            <a:r>
-              <a:rPr lang="en-GB" dirty="0">
-                <a:latin typeface="Consolas" panose="020B0609020204030204" pitchFamily="49" charset="0"/>
-              </a:rPr>
-              <a:t> </a:t>
-            </a:r>
-            <a:r>
-              <a:rPr lang="en-GB" sz="2000" dirty="0">
-                <a:latin typeface="Consolas" panose="020B0609020204030204" pitchFamily="49" charset="0"/>
-              </a:rPr>
-              <a:t>files = [</a:t>
-            </a:r>
-          </a:p>
-          <a:p>
-            <a:pPr marL="457200" lvl="1" indent="0">
-              <a:buNone/>
-            </a:pPr>
-            <a:r>
-              <a:rPr lang="en-GB" sz="2000" dirty="0">
-                <a:latin typeface="Consolas" panose="020B0609020204030204" pitchFamily="49" charset="0"/>
-              </a:rPr>
-              <a:t>    "20230721/KC.txt"</a:t>
-            </a:r>
-          </a:p>
-          <a:p>
-            <a:pPr marL="457200" lvl="1" indent="0">
-              <a:buNone/>
-            </a:pPr>
-            <a:r>
-              <a:rPr lang="en-GB" sz="2000" dirty="0">
-                <a:latin typeface="Consolas" panose="020B0609020204030204" pitchFamily="49" charset="0"/>
-              </a:rPr>
-              <a:t>    "20230721/gA.txt"</a:t>
-            </a:r>
-          </a:p>
-          <a:p>
-            <a:pPr marL="457200" lvl="1" indent="0">
-              <a:buNone/>
-            </a:pPr>
-            <a:r>
-              <a:rPr lang="en-GB" sz="2000" dirty="0">
-                <a:latin typeface="Consolas" panose="020B0609020204030204" pitchFamily="49" charset="0"/>
-              </a:rPr>
-              <a:t>    "20230722/lC.txt"</a:t>
-            </a:r>
-          </a:p>
-          <a:p>
-            <a:pPr marL="457200" lvl="1" indent="0">
-              <a:buNone/>
-            </a:pPr>
-            <a:r>
-              <a:rPr lang="en-GB" sz="2000" dirty="0">
-                <a:latin typeface="Consolas" panose="020B0609020204030204" pitchFamily="49" charset="0"/>
-              </a:rPr>
-              <a:t>    "20230722/lE.txt"</a:t>
-            </a:r>
-          </a:p>
-          <a:p>
-            <a:pPr marL="457200" lvl="1" indent="0">
-              <a:buNone/>
-            </a:pPr>
-            <a:r>
-              <a:rPr lang="en-GB" sz="2000" dirty="0">
-                <a:latin typeface="Consolas" panose="020B0609020204030204" pitchFamily="49" charset="0"/>
-              </a:rPr>
-              <a:t>    "20230724/qA.txt"</a:t>
-            </a:r>
-          </a:p>
-          <a:p>
-            <a:pPr marL="457200" lvl="1" indent="0">
-              <a:buNone/>
-            </a:pPr>
-            <a:r>
-              <a:rPr lang="en-GB" sz="2000" dirty="0">
-                <a:latin typeface="Consolas" panose="020B0609020204030204" pitchFamily="49" charset="0"/>
-              </a:rPr>
-              <a:t>    "20230725/SB.txt"</a:t>
-            </a:r>
-          </a:p>
-          <a:p>
-            <a:pPr marL="457200" lvl="1" indent="0">
-              <a:buNone/>
-            </a:pPr>
-            <a:r>
-              <a:rPr lang="en-GB" sz="2000" dirty="0">
-                <a:latin typeface="Consolas" panose="020B0609020204030204" pitchFamily="49" charset="0"/>
-              </a:rPr>
-              <a:t>    "20230725/VA.txt"];</a:t>
-            </a:r>
-          </a:p>
-          <a:p>
-            <a:r>
-              <a:rPr lang="en-GB" sz="2400" dirty="0">
-                <a:latin typeface="Consolas" panose="020B0609020204030204" pitchFamily="49" charset="0"/>
-              </a:rPr>
-              <a:t>You may add your own file(s) to the list</a:t>
-            </a:r>
           </a:p>
         </p:txBody>
       </p:sp>
     </p:spTree>
     <p:extLst>
       <p:ext uri="{BB962C8B-B14F-4D97-AF65-F5344CB8AC3E}">
-        <p14:creationId xmlns:p14="http://schemas.microsoft.com/office/powerpoint/2010/main" val="556922819"/>
+        <p14:creationId xmlns:p14="http://schemas.microsoft.com/office/powerpoint/2010/main" val="3502236513"/>
       </p:ext>
     </p:extLst>
   </p:cSld>
@@ -5403,7 +5655,7 @@
           <p:cNvPr id="2" name="Title 1">
             <a:extLst>
               <a:ext uri="{FF2B5EF4-FFF2-40B4-BE49-F238E27FC236}">
-                <a16:creationId xmlns:a16="http://schemas.microsoft.com/office/drawing/2014/main" id="{A2295294-4F30-87B1-7E5B-4754EC6E163D}"/>
+                <a16:creationId xmlns:a16="http://schemas.microsoft.com/office/drawing/2014/main" id="{D084B315-DB83-79C9-913F-45B087E1D832}"/>
               </a:ext>
             </a:extLst>
           </p:cNvPr>
@@ -5421,7 +5673,7 @@
           <a:p>
             <a:r>
               <a:rPr lang="en-GB" dirty="0"/>
-              <a:t>Exercise 3: Fit model to data</a:t>
+              <a:t>Exercise 3: Preparations</a:t>
             </a:r>
           </a:p>
         </p:txBody>
@@ -5431,7 +5683,7 @@
           <p:cNvPr id="3" name="Content Placeholder 2">
             <a:extLst>
               <a:ext uri="{FF2B5EF4-FFF2-40B4-BE49-F238E27FC236}">
-                <a16:creationId xmlns:a16="http://schemas.microsoft.com/office/drawing/2014/main" id="{55ECEF1D-CBC6-EE64-1E8D-565FF839036C}"/>
+                <a16:creationId xmlns:a16="http://schemas.microsoft.com/office/drawing/2014/main" id="{6DE37DAA-137B-1D5F-4AC9-4C8B37F15903}"/>
               </a:ext>
             </a:extLst>
           </p:cNvPr>
@@ -5451,120 +5703,126 @@
           <a:p>
             <a:r>
               <a:rPr lang="en-GB" dirty="0"/>
-              <a:t>Workflow:</a:t>
-            </a:r>
-            <a:endParaRPr lang="en-GB" noProof="0" dirty="0"/>
-          </a:p>
-          <a:p>
-            <a:pPr marL="914400" lvl="1" indent="-457200">
-              <a:buFont typeface="+mj-lt"/>
-              <a:buAutoNum type="arabicPeriod"/>
+              <a:t>In order to have enough data to work with, copy the contents of Summer school 2024/Testdata.zip to your </a:t>
+            </a:r>
+            <a:r>
+              <a:rPr lang="en-GB" dirty="0" err="1"/>
+              <a:t>Datafolder</a:t>
+            </a:r>
+            <a:endParaRPr lang="en-GB" dirty="0"/>
+          </a:p>
+          <a:p>
+            <a:r>
+              <a:rPr lang="en-GB" dirty="0"/>
+              <a:t>In Matlab:</a:t>
+            </a:r>
+            <a:br>
+              <a:rPr lang="en-GB" dirty="0"/>
+            </a:br>
+            <a:r>
+              <a:rPr lang="en-GB" dirty="0">
+                <a:latin typeface="Consolas" panose="020B0609020204030204" pitchFamily="49" charset="0"/>
+              </a:rPr>
+              <a:t> </a:t>
+            </a:r>
+            <a:r>
+              <a:rPr lang="en-GB" sz="2000" dirty="0">
+                <a:latin typeface="Consolas" panose="020B0609020204030204" pitchFamily="49" charset="0"/>
+              </a:rPr>
+              <a:t>files = [</a:t>
+            </a:r>
+          </a:p>
+          <a:p>
+            <a:pPr marL="457200" lvl="1" indent="0">
+              <a:buNone/>
             </a:pPr>
             <a:r>
-              <a:rPr lang="en-GB" noProof="0" dirty="0"/>
-              <a:t>Collect all analysis result tables into TRIP and TZIP</a:t>
-            </a:r>
-          </a:p>
-          <a:p>
-            <a:pPr marL="914400" lvl="1" indent="-457200">
-              <a:buFont typeface="+mj-lt"/>
-              <a:buAutoNum type="arabicPeriod"/>
+              <a:rPr lang="en-GB" sz="2000" dirty="0">
+                <a:latin typeface="Consolas" panose="020B0609020204030204" pitchFamily="49" charset="0"/>
+              </a:rPr>
+              <a:t>    "20230721/KC.txt"</a:t>
+            </a:r>
+          </a:p>
+          <a:p>
+            <a:pPr marL="457200" lvl="1" indent="0">
+              <a:buNone/>
             </a:pPr>
             <a:r>
-              <a:rPr lang="en-GB" noProof="0" dirty="0"/>
-              <a:t>Select the subset you want to model (e.g. Temperature &gt; 20)</a:t>
-            </a:r>
-          </a:p>
-          <a:p>
-            <a:pPr marL="914400" lvl="1" indent="-457200">
-              <a:buFont typeface="+mj-lt"/>
-              <a:buAutoNum type="arabicPeriod"/>
+              <a:rPr lang="en-GB" sz="2000" dirty="0">
+                <a:latin typeface="Consolas" panose="020B0609020204030204" pitchFamily="49" charset="0"/>
+              </a:rPr>
+              <a:t>    "20230721/gA.txt"</a:t>
+            </a:r>
+          </a:p>
+          <a:p>
+            <a:pPr marL="457200" lvl="1" indent="0">
+              <a:buNone/>
             </a:pPr>
             <a:r>
-              <a:rPr lang="en-GB" noProof="0" dirty="0"/>
-              <a:t>Prepare the input to </a:t>
-            </a:r>
-            <a:r>
-              <a:rPr lang="en-GB" sz="2000" noProof="0" dirty="0" err="1">
+              <a:rPr lang="en-GB" sz="2000" dirty="0">
                 <a:latin typeface="Consolas" panose="020B0609020204030204" pitchFamily="49" charset="0"/>
               </a:rPr>
-              <a:t>fit_Bell_unfold.m</a:t>
-            </a:r>
-            <a:endParaRPr lang="en-GB" noProof="0" dirty="0"/>
-          </a:p>
-          <a:p>
-            <a:pPr marL="914400" lvl="1" indent="-457200">
-              <a:buFont typeface="+mj-lt"/>
-              <a:buAutoNum type="arabicPeriod"/>
+              <a:t>    "20230722/lC.txt"</a:t>
+            </a:r>
+          </a:p>
+          <a:p>
+            <a:pPr marL="457200" lvl="1" indent="0">
+              <a:buNone/>
             </a:pPr>
             <a:r>
-              <a:rPr lang="en-GB" noProof="0" dirty="0"/>
-              <a:t>Define initial values for the parameter vector </a:t>
-            </a:r>
-          </a:p>
-          <a:p>
-            <a:pPr marL="914400" lvl="1" indent="-457200">
-              <a:buFont typeface="+mj-lt"/>
-              <a:buAutoNum type="arabicPeriod"/>
+              <a:rPr lang="en-GB" sz="2000" dirty="0">
+                <a:latin typeface="Consolas" panose="020B0609020204030204" pitchFamily="49" charset="0"/>
+              </a:rPr>
+              <a:t>    "20230722/lE.txt"</a:t>
+            </a:r>
+          </a:p>
+          <a:p>
+            <a:pPr marL="457200" lvl="1" indent="0">
+              <a:buNone/>
             </a:pPr>
             <a:r>
-              <a:rPr lang="en-GB" noProof="0" dirty="0"/>
-              <a:t>Calculate best fit parameters for the Bell model</a:t>
-            </a:r>
-          </a:p>
-          <a:p>
-            <a:pPr marL="914400" lvl="1" indent="-457200">
-              <a:buFont typeface="+mj-lt"/>
-              <a:buAutoNum type="arabicPeriod"/>
+              <a:rPr lang="en-GB" sz="2000" dirty="0">
+                <a:latin typeface="Consolas" panose="020B0609020204030204" pitchFamily="49" charset="0"/>
+              </a:rPr>
+              <a:t>    "20230724/qA.txt"</a:t>
+            </a:r>
+          </a:p>
+          <a:p>
+            <a:pPr marL="457200" lvl="1" indent="0">
+              <a:buNone/>
             </a:pPr>
             <a:r>
-              <a:rPr lang="en-GB" noProof="0" dirty="0"/>
-              <a:t>Check that results look ok</a:t>
-            </a:r>
-          </a:p>
-          <a:p>
-            <a:pPr lvl="2"/>
-            <a:r>
-              <a:rPr lang="en-GB" noProof="0" dirty="0"/>
-              <a:t>If not, try with other initial values</a:t>
-            </a:r>
-          </a:p>
-          <a:p>
-            <a:r>
-              <a:rPr lang="en-GB" noProof="0" dirty="0"/>
-              <a:t>See next slide for items 1 and 2</a:t>
-            </a:r>
-          </a:p>
-          <a:p>
-            <a:r>
-              <a:rPr lang="en-GB" dirty="0"/>
-              <a:t>If you still have time: Try to fit the </a:t>
-            </a:r>
-            <a:r>
-              <a:rPr lang="en-GB" dirty="0" err="1"/>
-              <a:t>Dudko</a:t>
-            </a:r>
-            <a:r>
-              <a:rPr lang="en-GB" dirty="0"/>
-              <a:t> model</a:t>
-            </a:r>
-          </a:p>
-          <a:p>
-            <a:pPr lvl="1"/>
-            <a:r>
-              <a:rPr lang="en-GB" noProof="0" dirty="0"/>
-              <a:t>Compare parameters and standard deviations to the Bell model</a:t>
-            </a:r>
-          </a:p>
-          <a:p>
-            <a:endParaRPr lang="en-GB" noProof="0" dirty="0"/>
+              <a:rPr lang="en-GB" sz="2000" dirty="0">
+                <a:latin typeface="Consolas" panose="020B0609020204030204" pitchFamily="49" charset="0"/>
+              </a:rPr>
+              <a:t>    "20230725/SB.txt"</a:t>
+            </a:r>
+          </a:p>
+          <a:p>
+            <a:pPr marL="457200" lvl="1" indent="0">
+              <a:buNone/>
+            </a:pPr>
+            <a:r>
+              <a:rPr lang="en-GB" sz="2000" dirty="0">
+                <a:latin typeface="Consolas" panose="020B0609020204030204" pitchFamily="49" charset="0"/>
+              </a:rPr>
+              <a:t>    "20230725/VA.txt"];</a:t>
+            </a:r>
+          </a:p>
+          <a:p>
+            <a:r>
+              <a:rPr lang="en-GB" sz="2400" dirty="0">
+                <a:latin typeface="Consolas" panose="020B0609020204030204" pitchFamily="49" charset="0"/>
+              </a:rPr>
+              <a:t>You may add your own file(s) to the list</a:t>
+            </a:r>
           </a:p>
         </p:txBody>
       </p:sp>
     </p:spTree>
     <p:extLst>
       <p:ext uri="{BB962C8B-B14F-4D97-AF65-F5344CB8AC3E}">
-        <p14:creationId xmlns:p14="http://schemas.microsoft.com/office/powerpoint/2010/main" val="701316892"/>
+        <p14:creationId xmlns:p14="http://schemas.microsoft.com/office/powerpoint/2010/main" val="556922819"/>
       </p:ext>
     </p:extLst>
   </p:cSld>
@@ -5596,7 +5854,7 @@
           <p:cNvPr id="2" name="Title 1">
             <a:extLst>
               <a:ext uri="{FF2B5EF4-FFF2-40B4-BE49-F238E27FC236}">
-                <a16:creationId xmlns:a16="http://schemas.microsoft.com/office/drawing/2014/main" id="{7EFFD64D-BDF3-8D5C-E07D-C72B868749D9}"/>
+                <a16:creationId xmlns:a16="http://schemas.microsoft.com/office/drawing/2014/main" id="{A2295294-4F30-87B1-7E5B-4754EC6E163D}"/>
               </a:ext>
             </a:extLst>
           </p:cNvPr>
@@ -5614,7 +5872,7 @@
           <a:p>
             <a:r>
               <a:rPr lang="en-GB" dirty="0"/>
-              <a:t>Exercise 3 (continued)</a:t>
+              <a:t>Exercise 3: Fit model to data</a:t>
             </a:r>
           </a:p>
         </p:txBody>
@@ -5624,7 +5882,7 @@
           <p:cNvPr id="3" name="Content Placeholder 2">
             <a:extLst>
               <a:ext uri="{FF2B5EF4-FFF2-40B4-BE49-F238E27FC236}">
-                <a16:creationId xmlns:a16="http://schemas.microsoft.com/office/drawing/2014/main" id="{FA104812-A7B4-56B7-2EFB-3BBE89CF5C1A}"/>
+                <a16:creationId xmlns:a16="http://schemas.microsoft.com/office/drawing/2014/main" id="{55ECEF1D-CBC6-EE64-1E8D-565FF839036C}"/>
               </a:ext>
             </a:extLst>
           </p:cNvPr>
@@ -5638,204 +5896,126 @@
         <p:spPr/>
         <p:txBody>
           <a:bodyPr>
-            <a:normAutofit fontScale="92500" lnSpcReduction="20000"/>
+            <a:normAutofit lnSpcReduction="10000"/>
           </a:bodyPr>
           <a:lstStyle/>
           <a:p>
             <a:r>
+              <a:rPr lang="en-GB" dirty="0"/>
+              <a:t>Workflow:</a:t>
+            </a:r>
+            <a:endParaRPr lang="en-GB" noProof="0" dirty="0"/>
+          </a:p>
+          <a:p>
+            <a:pPr marL="914400" lvl="1" indent="-457200">
+              <a:buFont typeface="+mj-lt"/>
+              <a:buAutoNum type="arabicPeriod"/>
+            </a:pPr>
+            <a:r>
               <a:rPr lang="en-GB" noProof="0" dirty="0"/>
-              <a:t>To collect all analysis result tables into TRIP and TZIP</a:t>
-            </a:r>
-            <a:endParaRPr lang="en-GB" dirty="0"/>
+              <a:t>Collect all analysis result tables into TRIP and TZIP</a:t>
+            </a:r>
+          </a:p>
+          <a:p>
+            <a:pPr marL="914400" lvl="1" indent="-457200">
+              <a:buFont typeface="+mj-lt"/>
+              <a:buAutoNum type="arabicPeriod"/>
+            </a:pPr>
+            <a:r>
+              <a:rPr lang="en-GB" noProof="0" dirty="0"/>
+              <a:t>Select the subset you want to model (e.g. Temperature &gt; 20)</a:t>
+            </a:r>
+          </a:p>
+          <a:p>
+            <a:pPr marL="914400" lvl="1" indent="-457200">
+              <a:buFont typeface="+mj-lt"/>
+              <a:buAutoNum type="arabicPeriod"/>
+            </a:pPr>
+            <a:r>
+              <a:rPr lang="en-GB" noProof="0" dirty="0"/>
+              <a:t>Prepare the input to </a:t>
+            </a:r>
+            <a:r>
+              <a:rPr lang="en-GB" sz="2000" noProof="0" dirty="0" err="1">
+                <a:latin typeface="Consolas" panose="020B0609020204030204" pitchFamily="49" charset="0"/>
+              </a:rPr>
+              <a:t>fit_Bell_unfold.m</a:t>
+            </a:r>
+            <a:endParaRPr lang="en-GB" noProof="0" dirty="0"/>
+          </a:p>
+          <a:p>
+            <a:pPr marL="914400" lvl="1" indent="-457200">
+              <a:buFont typeface="+mj-lt"/>
+              <a:buAutoNum type="arabicPeriod"/>
+            </a:pPr>
+            <a:r>
+              <a:rPr lang="en-GB" noProof="0" dirty="0"/>
+              <a:t>Define initial values for the parameter vector </a:t>
+            </a:r>
+          </a:p>
+          <a:p>
+            <a:pPr marL="914400" lvl="1" indent="-457200">
+              <a:buFont typeface="+mj-lt"/>
+              <a:buAutoNum type="arabicPeriod"/>
+            </a:pPr>
+            <a:r>
+              <a:rPr lang="en-GB" noProof="0" dirty="0"/>
+              <a:t>Calculate best fit parameters for the Bell model</a:t>
+            </a:r>
+          </a:p>
+          <a:p>
+            <a:pPr marL="914400" lvl="1" indent="-457200">
+              <a:buFont typeface="+mj-lt"/>
+              <a:buAutoNum type="arabicPeriod"/>
+            </a:pPr>
+            <a:r>
+              <a:rPr lang="en-GB" noProof="0" dirty="0"/>
+              <a:t>Check that results look ok</a:t>
+            </a:r>
+          </a:p>
+          <a:p>
+            <a:pPr lvl="2"/>
+            <a:r>
+              <a:rPr lang="en-GB" noProof="0" dirty="0"/>
+              <a:t>If not, try with other initial values</a:t>
+            </a:r>
+          </a:p>
+          <a:p>
+            <a:r>
+              <a:rPr lang="en-GB" noProof="0" dirty="0"/>
+              <a:t>See next slide for items 1 and 2</a:t>
+            </a:r>
+          </a:p>
+          <a:p>
+            <a:r>
+              <a:rPr lang="en-GB" dirty="0"/>
+              <a:t>If you still have time: Try to fit the </a:t>
+            </a:r>
+            <a:r>
+              <a:rPr lang="en-GB" dirty="0" err="1"/>
+              <a:t>Dudko</a:t>
+            </a:r>
+            <a:r>
+              <a:rPr lang="en-GB" dirty="0"/>
+              <a:t> model</a:t>
+            </a:r>
           </a:p>
           <a:p>
             <a:pPr lvl="1"/>
             <a:r>
-              <a:rPr lang="en-GB" sz="2600" dirty="0"/>
-              <a:t>Create result tables for all the files:</a:t>
-            </a:r>
-          </a:p>
-          <a:p>
-            <a:pPr marL="914400" lvl="2" indent="0">
-              <a:buNone/>
-            </a:pPr>
-            <a:r>
-              <a:rPr lang="en-GB" sz="2200" dirty="0">
-                <a:latin typeface="Consolas" panose="020B0609020204030204" pitchFamily="49" charset="0"/>
-              </a:rPr>
-              <a:t>	[TRIP,TZIP] = </a:t>
-            </a:r>
-            <a:r>
-              <a:rPr lang="en-GB" sz="2200" dirty="0" err="1">
-                <a:latin typeface="Consolas" panose="020B0609020204030204" pitchFamily="49" charset="0"/>
-              </a:rPr>
-              <a:t>analyse_many</a:t>
-            </a:r>
-            <a:r>
-              <a:rPr lang="en-GB" sz="2200" dirty="0">
-                <a:latin typeface="Consolas" panose="020B0609020204030204" pitchFamily="49" charset="0"/>
-              </a:rPr>
-              <a:t>(files);</a:t>
-            </a:r>
-          </a:p>
-          <a:p>
-            <a:pPr marL="914400" lvl="2" indent="0">
-              <a:buNone/>
-            </a:pPr>
-            <a:r>
-              <a:rPr lang="en-GB" sz="2200" dirty="0">
-                <a:latin typeface="Consolas" panose="020B0609020204030204" pitchFamily="49" charset="0"/>
-              </a:rPr>
-              <a:t>If you have made modifications in the app, do this instead</a:t>
-            </a:r>
-          </a:p>
-          <a:p>
-            <a:pPr marL="1371600" lvl="3" indent="0">
-              <a:buNone/>
-            </a:pPr>
-            <a:r>
-              <a:rPr lang="en-GB" sz="2200" dirty="0">
-                <a:latin typeface="Consolas" panose="020B0609020204030204" pitchFamily="49" charset="0"/>
-              </a:rPr>
-              <a:t>[TRIP,TZIP] = </a:t>
-            </a:r>
-            <a:r>
-              <a:rPr lang="en-GB" sz="2200" dirty="0" err="1">
-                <a:latin typeface="Consolas" panose="020B0609020204030204" pitchFamily="49" charset="0"/>
-              </a:rPr>
-              <a:t>collect_tables</a:t>
-            </a:r>
-            <a:r>
-              <a:rPr lang="en-GB" sz="2200" dirty="0">
-                <a:latin typeface="Consolas" panose="020B0609020204030204" pitchFamily="49" charset="0"/>
-              </a:rPr>
-              <a:t>(files);</a:t>
-            </a:r>
-          </a:p>
-          <a:p>
-            <a:r>
-              <a:rPr lang="en-GB" dirty="0">
-                <a:latin typeface="+mj-lt"/>
-              </a:rPr>
-              <a:t>Check the distributions of, say, Temperature and </a:t>
-            </a:r>
-            <a:r>
-              <a:rPr lang="en-GB" dirty="0" err="1">
-                <a:latin typeface="+mj-lt"/>
-              </a:rPr>
-              <a:t>Pullingspeed</a:t>
-            </a:r>
-            <a:r>
-              <a:rPr lang="en-GB" dirty="0">
-                <a:latin typeface="+mj-lt"/>
-              </a:rPr>
-              <a:t>:</a:t>
-            </a:r>
-          </a:p>
-          <a:p>
-            <a:pPr marL="457200" lvl="1" indent="0">
-              <a:buNone/>
-            </a:pPr>
-            <a:r>
-              <a:rPr lang="en-GB" dirty="0">
-                <a:latin typeface="Consolas" panose="020B0609020204030204" pitchFamily="49" charset="0"/>
-              </a:rPr>
-              <a:t>figure; histogram(TRIP.Temperature,50)</a:t>
-            </a:r>
-          </a:p>
-          <a:p>
-            <a:pPr marL="457200" lvl="1" indent="0">
-              <a:buNone/>
-            </a:pPr>
-            <a:r>
-              <a:rPr lang="en-GB" dirty="0">
-                <a:latin typeface="Consolas" panose="020B0609020204030204" pitchFamily="49" charset="0"/>
-              </a:rPr>
-              <a:t>figure; histogram(TRIP.Pullingspeed,50)</a:t>
-            </a:r>
-          </a:p>
-          <a:p>
-            <a:r>
-              <a:rPr lang="en-GB" dirty="0"/>
-              <a:t>Select subsets:</a:t>
-            </a:r>
-          </a:p>
-          <a:p>
-            <a:pPr marL="914400" lvl="2" indent="0">
-              <a:buNone/>
-            </a:pPr>
-            <a:r>
-              <a:rPr lang="en-GB" sz="2600" b="0" i="0" dirty="0">
-                <a:effectLst/>
-                <a:latin typeface="Menlo"/>
-              </a:rPr>
-              <a:t>ok = </a:t>
-            </a:r>
-            <a:r>
-              <a:rPr lang="en-GB" sz="2600" b="0" i="0" dirty="0" err="1">
-                <a:effectLst/>
-                <a:latin typeface="Menlo"/>
-              </a:rPr>
-              <a:t>TRIP.Temperature</a:t>
-            </a:r>
-            <a:r>
-              <a:rPr lang="en-GB" sz="2600" b="0" i="0" dirty="0">
-                <a:effectLst/>
-                <a:latin typeface="Menlo"/>
-              </a:rPr>
-              <a:t>&gt;5 &amp; </a:t>
-            </a:r>
-            <a:r>
-              <a:rPr lang="en-GB" sz="2600" b="0" i="0" dirty="0" err="1">
-                <a:effectLst/>
-                <a:latin typeface="Menlo"/>
-              </a:rPr>
-              <a:t>TRIP.Fdot</a:t>
-            </a:r>
-            <a:r>
-              <a:rPr lang="en-GB" sz="2600" b="0" i="0" dirty="0">
-                <a:effectLst/>
-                <a:latin typeface="Menlo"/>
-              </a:rPr>
-              <a:t> &lt; 15;</a:t>
-            </a:r>
-          </a:p>
-          <a:p>
-            <a:r>
               <a:rPr lang="en-GB" noProof="0" dirty="0"/>
-              <a:t>See </a:t>
-            </a:r>
-            <a:r>
-              <a:rPr lang="en-GB" sz="2800" noProof="0" dirty="0">
-                <a:latin typeface="Consolas" panose="020B0609020204030204" pitchFamily="49" charset="0"/>
-              </a:rPr>
-              <a:t>Fitting models to experiment.pptx </a:t>
-            </a:r>
-            <a:r>
-              <a:rPr lang="en-GB" noProof="0" dirty="0"/>
-              <a:t>for details about the remaining items.</a:t>
-            </a:r>
-            <a:endParaRPr lang="en-GB" dirty="0">
-              <a:latin typeface="Consolas" panose="020B0609020204030204" pitchFamily="49" charset="0"/>
-            </a:endParaRPr>
-          </a:p>
-          <a:p>
-            <a:pPr marL="457200" lvl="1" indent="0">
-              <a:buNone/>
-            </a:pPr>
-            <a:r>
-              <a:rPr lang="en-GB" dirty="0">
-                <a:latin typeface="Consolas" panose="020B0609020204030204" pitchFamily="49" charset="0"/>
-              </a:rPr>
-              <a:t> </a:t>
-            </a:r>
+              <a:t>Compare parameters and standard deviations to the Bell model</a:t>
+            </a:r>
+          </a:p>
+          <a:p>
+            <a:endParaRPr lang="en-GB" noProof="0" dirty="0"/>
           </a:p>
         </p:txBody>
       </p:sp>
     </p:spTree>
     <p:extLst>
       <p:ext uri="{BB962C8B-B14F-4D97-AF65-F5344CB8AC3E}">
-        <p14:creationId xmlns:p14="http://schemas.microsoft.com/office/powerpoint/2010/main" val="3564220129"/>
+        <p14:creationId xmlns:p14="http://schemas.microsoft.com/office/powerpoint/2010/main" val="701316892"/>
       </p:ext>
     </p:extLst>
   </p:cSld>
@@ -5867,7 +6047,7 @@
           <p:cNvPr id="2" name="Title 1">
             <a:extLst>
               <a:ext uri="{FF2B5EF4-FFF2-40B4-BE49-F238E27FC236}">
-                <a16:creationId xmlns:a16="http://schemas.microsoft.com/office/drawing/2014/main" id="{5026A303-801F-D02A-EBE5-961D86273945}"/>
+                <a16:creationId xmlns:a16="http://schemas.microsoft.com/office/drawing/2014/main" id="{7EFFD64D-BDF3-8D5C-E07D-C72B868749D9}"/>
               </a:ext>
             </a:extLst>
           </p:cNvPr>
@@ -5880,122 +6060,233 @@
         </p:nvSpPr>
         <p:spPr/>
         <p:txBody>
+          <a:bodyPr/>
+          <a:lstStyle/>
+          <a:p>
+            <a:r>
+              <a:rPr lang="en-GB" dirty="0"/>
+              <a:t>Exercise 3 (continued)</a:t>
+            </a:r>
+          </a:p>
+        </p:txBody>
+      </p:sp>
+      <p:sp>
+        <p:nvSpPr>
+          <p:cNvPr id="3" name="Content Placeholder 2">
+            <a:extLst>
+              <a:ext uri="{FF2B5EF4-FFF2-40B4-BE49-F238E27FC236}">
+                <a16:creationId xmlns:a16="http://schemas.microsoft.com/office/drawing/2014/main" id="{FA104812-A7B4-56B7-2EFB-3BBE89CF5C1A}"/>
+              </a:ext>
+            </a:extLst>
+          </p:cNvPr>
+          <p:cNvSpPr>
+            <a:spLocks noGrp="1"/>
+          </p:cNvSpPr>
+          <p:nvPr>
+            <p:ph idx="1"/>
+          </p:nvPr>
+        </p:nvSpPr>
+        <p:spPr/>
+        <p:txBody>
           <a:bodyPr>
-            <a:normAutofit/>
+            <a:normAutofit fontScale="92500" lnSpcReduction="20000"/>
           </a:bodyPr>
           <a:lstStyle/>
           <a:p>
+            <a:r>
+              <a:rPr lang="en-GB" noProof="0" dirty="0"/>
+              <a:t>To collect all analysis result tables into TRIP and TZIP</a:t>
+            </a:r>
+            <a:endParaRPr lang="en-GB" dirty="0"/>
+          </a:p>
+          <a:p>
             <a:pPr lvl="1"/>
             <a:r>
-              <a:rPr lang="en-GB" sz="3600" dirty="0"/>
-              <a:t>Help needed!</a:t>
-            </a:r>
-          </a:p>
-        </p:txBody>
-      </p:sp>
-      <p:sp>
-        <p:nvSpPr>
-          <p:cNvPr id="3" name="Content Placeholder 2">
-            <a:extLst>
-              <a:ext uri="{FF2B5EF4-FFF2-40B4-BE49-F238E27FC236}">
-                <a16:creationId xmlns:a16="http://schemas.microsoft.com/office/drawing/2014/main" id="{D3A57773-0ED5-BABD-9ED7-8C7E2A692B3B}"/>
-              </a:ext>
-            </a:extLst>
-          </p:cNvPr>
-          <p:cNvSpPr>
-            <a:spLocks noGrp="1"/>
-          </p:cNvSpPr>
-          <p:nvPr>
-            <p:ph idx="1"/>
-          </p:nvPr>
-        </p:nvSpPr>
-        <p:spPr/>
-        <p:txBody>
-          <a:bodyPr>
-            <a:normAutofit lnSpcReduction="10000"/>
-          </a:bodyPr>
-          <a:lstStyle/>
-          <a:p>
-            <a:r>
-              <a:rPr lang="en-GB" dirty="0"/>
-              <a:t>The Matlab programs have a single author</a:t>
-            </a:r>
-          </a:p>
-          <a:p>
-            <a:r>
-              <a:rPr lang="en-GB" dirty="0"/>
-              <a:t>Need new blood!</a:t>
-            </a:r>
-          </a:p>
-          <a:p>
-            <a:pPr lvl="1"/>
-            <a:r>
-              <a:rPr lang="en-GB" dirty="0"/>
-              <a:t>Two minds think better that one!</a:t>
-            </a:r>
-          </a:p>
-          <a:p>
-            <a:pPr lvl="1"/>
-            <a:r>
-              <a:rPr lang="en-GB" dirty="0"/>
-              <a:t>There are probably better ways to do many things</a:t>
-            </a:r>
-          </a:p>
-          <a:p>
-            <a:pPr lvl="1"/>
-            <a:r>
-              <a:rPr lang="en-GB" dirty="0"/>
-              <a:t>I am getting old!</a:t>
-            </a:r>
-          </a:p>
-          <a:p>
-            <a:pPr marL="0" indent="0">
+              <a:rPr lang="en-GB" sz="2600" dirty="0"/>
+              <a:t>Create result tables for all the files:</a:t>
+            </a:r>
+          </a:p>
+          <a:p>
+            <a:pPr marL="914400" lvl="2" indent="0">
               <a:buNone/>
             </a:pPr>
-            <a:endParaRPr lang="en-GB" dirty="0"/>
-          </a:p>
-          <a:p>
-            <a:r>
-              <a:rPr lang="en-GB" dirty="0"/>
-              <a:t>Interested in helping with program development and maintenance?</a:t>
-            </a:r>
-          </a:p>
-          <a:p>
-            <a:pPr lvl="1"/>
-            <a:r>
-              <a:rPr lang="en-GB" dirty="0"/>
-              <a:t>Please contact Christian Wilson or me.</a:t>
-            </a:r>
-          </a:p>
-          <a:p>
-            <a:pPr lvl="1"/>
-            <a:r>
-              <a:rPr lang="en-GB" dirty="0"/>
-              <a:t>For my Email address, please type: </a:t>
+            <a:r>
+              <a:rPr lang="en-GB" sz="2200" dirty="0">
+                <a:latin typeface="Consolas" panose="020B0609020204030204" pitchFamily="49" charset="0"/>
+              </a:rPr>
+              <a:t>	[TRIP,TZIP] = </a:t>
+            </a:r>
+            <a:r>
+              <a:rPr lang="en-GB" sz="2200" dirty="0" err="1">
+                <a:latin typeface="Consolas" panose="020B0609020204030204" pitchFamily="49" charset="0"/>
+              </a:rPr>
+              <a:t>analyse_many</a:t>
+            </a:r>
+            <a:r>
+              <a:rPr lang="en-GB" sz="2200" dirty="0">
+                <a:latin typeface="Consolas" panose="020B0609020204030204" pitchFamily="49" charset="0"/>
+              </a:rPr>
+              <a:t>(files);</a:t>
+            </a:r>
+          </a:p>
+          <a:p>
+            <a:pPr marL="914400" lvl="2" indent="0">
+              <a:buNone/>
+            </a:pPr>
+            <a:r>
+              <a:rPr lang="en-GB" sz="2200" dirty="0">
+                <a:latin typeface="Consolas" panose="020B0609020204030204" pitchFamily="49" charset="0"/>
+              </a:rPr>
+              <a:t>If you have made modifications in the app, do this instead</a:t>
+            </a:r>
+          </a:p>
+          <a:p>
+            <a:pPr marL="1371600" lvl="3" indent="0">
+              <a:buNone/>
+            </a:pPr>
+            <a:r>
+              <a:rPr lang="en-GB" sz="2200" dirty="0">
+                <a:latin typeface="Consolas" panose="020B0609020204030204" pitchFamily="49" charset="0"/>
+              </a:rPr>
+              <a:t>[TRIP,TZIP] = </a:t>
+            </a:r>
+            <a:r>
+              <a:rPr lang="en-GB" sz="2200" dirty="0" err="1">
+                <a:latin typeface="Consolas" panose="020B0609020204030204" pitchFamily="49" charset="0"/>
+              </a:rPr>
+              <a:t>collect_tables</a:t>
+            </a:r>
+            <a:r>
+              <a:rPr lang="en-GB" sz="2200" dirty="0">
+                <a:latin typeface="Consolas" panose="020B0609020204030204" pitchFamily="49" charset="0"/>
+              </a:rPr>
+              <a:t>(files);</a:t>
+            </a:r>
+          </a:p>
+          <a:p>
+            <a:r>
+              <a:rPr lang="en-GB" dirty="0">
+                <a:latin typeface="+mj-lt"/>
+              </a:rPr>
+              <a:t>Check the distributions of, say, Temperature and </a:t>
             </a:r>
             <a:r>
               <a:rPr lang="en-GB" dirty="0" err="1">
+                <a:latin typeface="+mj-lt"/>
+              </a:rPr>
+              <a:t>Pullingspeed</a:t>
+            </a:r>
+            <a:r>
+              <a:rPr lang="en-GB" dirty="0">
+                <a:latin typeface="+mj-lt"/>
+              </a:rPr>
+              <a:t>:</a:t>
+            </a:r>
+          </a:p>
+          <a:p>
+            <a:pPr marL="457200" lvl="1" indent="0">
+              <a:buNone/>
+            </a:pPr>
+            <a:r>
+              <a:rPr lang="en-GB" dirty="0">
                 <a:latin typeface="Consolas" panose="020B0609020204030204" pitchFamily="49" charset="0"/>
               </a:rPr>
-              <a:t>contact_details</a:t>
-            </a:r>
-            <a:r>
-              <a:rPr lang="en-GB" dirty="0"/>
-              <a:t> in Matlab</a:t>
-            </a:r>
-          </a:p>
-          <a:p>
-            <a:pPr marL="0" indent="0">
+              <a:t>figure; histogram(TRIP.Temperature,50)</a:t>
+            </a:r>
+          </a:p>
+          <a:p>
+            <a:pPr marL="457200" lvl="1" indent="0">
               <a:buNone/>
             </a:pPr>
-            <a:endParaRPr lang="en-GB" dirty="0"/>
+            <a:r>
+              <a:rPr lang="en-GB" dirty="0">
+                <a:latin typeface="Consolas" panose="020B0609020204030204" pitchFamily="49" charset="0"/>
+              </a:rPr>
+              <a:t>figure; histogram(TRIP.Pullingspeed,50)</a:t>
+            </a:r>
+          </a:p>
+          <a:p>
+            <a:r>
+              <a:rPr lang="en-GB" dirty="0"/>
+              <a:t>Select subsets:</a:t>
+            </a:r>
+          </a:p>
+          <a:p>
+            <a:pPr marL="914400" lvl="2" indent="0">
+              <a:buNone/>
+            </a:pPr>
+            <a:r>
+              <a:rPr lang="en-GB" sz="2600" b="0" i="0" dirty="0">
+                <a:effectLst/>
+                <a:latin typeface="Menlo"/>
+              </a:rPr>
+              <a:t>ok = </a:t>
+            </a:r>
+            <a:r>
+              <a:rPr lang="en-GB" sz="2600" b="0" i="0" dirty="0" err="1">
+                <a:effectLst/>
+                <a:latin typeface="Menlo"/>
+              </a:rPr>
+              <a:t>TRIP.Temperature</a:t>
+            </a:r>
+            <a:r>
+              <a:rPr lang="en-GB" sz="2600" b="0" i="0" dirty="0">
+                <a:effectLst/>
+                <a:latin typeface="Menlo"/>
+              </a:rPr>
+              <a:t>&gt;5 &amp; </a:t>
+            </a:r>
+            <a:r>
+              <a:rPr lang="en-GB" sz="2600" b="0" i="0" dirty="0" err="1">
+                <a:effectLst/>
+                <a:latin typeface="Menlo"/>
+              </a:rPr>
+              <a:t>TRIP.Fdot</a:t>
+            </a:r>
+            <a:r>
+              <a:rPr lang="en-GB" sz="2600" b="0" i="0" dirty="0">
+                <a:effectLst/>
+                <a:latin typeface="Menlo"/>
+              </a:rPr>
+              <a:t> &lt; 15;</a:t>
+            </a:r>
+          </a:p>
+          <a:p>
+            <a:r>
+              <a:rPr lang="en-GB" noProof="0" dirty="0"/>
+              <a:t>See </a:t>
+            </a:r>
+            <a:r>
+              <a:rPr lang="en-GB" sz="2800" noProof="0" dirty="0">
+                <a:latin typeface="Consolas" panose="020B0609020204030204" pitchFamily="49" charset="0"/>
+              </a:rPr>
+              <a:t>Fitting models to experiment.pptx </a:t>
+            </a:r>
+            <a:r>
+              <a:rPr lang="en-GB" noProof="0" dirty="0"/>
+              <a:t>for details about the remaining items.</a:t>
+            </a:r>
+            <a:endParaRPr lang="en-GB" dirty="0">
+              <a:latin typeface="Consolas" panose="020B0609020204030204" pitchFamily="49" charset="0"/>
+            </a:endParaRPr>
+          </a:p>
+          <a:p>
+            <a:pPr marL="457200" lvl="1" indent="0">
+              <a:buNone/>
+            </a:pPr>
+            <a:r>
+              <a:rPr lang="en-GB" dirty="0">
+                <a:latin typeface="Consolas" panose="020B0609020204030204" pitchFamily="49" charset="0"/>
+              </a:rPr>
+              <a:t> </a:t>
+            </a:r>
           </a:p>
         </p:txBody>
       </p:sp>
     </p:spTree>
     <p:extLst>
       <p:ext uri="{BB962C8B-B14F-4D97-AF65-F5344CB8AC3E}">
-        <p14:creationId xmlns:p14="http://schemas.microsoft.com/office/powerpoint/2010/main" val="859442970"/>
+        <p14:creationId xmlns:p14="http://schemas.microsoft.com/office/powerpoint/2010/main" val="3564220129"/>
       </p:ext>
     </p:extLst>
   </p:cSld>
@@ -6066,9 +6357,16 @@
             <p:ph idx="1"/>
           </p:nvPr>
         </p:nvSpPr>
-        <p:spPr/>
-        <p:txBody>
-          <a:bodyPr/>
+        <p:spPr>
+          <a:xfrm>
+            <a:off x="838200" y="1825625"/>
+            <a:ext cx="10515600" cy="3775075"/>
+          </a:xfrm>
+        </p:spPr>
+        <p:txBody>
+          <a:bodyPr>
+            <a:normAutofit lnSpcReduction="10000"/>
+          </a:bodyPr>
           <a:lstStyle/>
           <a:p>
             <a:r>
@@ -6108,17 +6406,25 @@
           <a:p>
             <a:r>
               <a:rPr lang="en-GB" noProof="0" dirty="0"/>
+              <a:t>In Matlab:</a:t>
+            </a:r>
+          </a:p>
+          <a:p>
+            <a:pPr lvl="1"/>
+            <a:r>
+              <a:rPr lang="en-GB" noProof="0" dirty="0"/>
               <a:t>cd  to the working folder</a:t>
             </a:r>
           </a:p>
           <a:p>
+            <a:pPr lvl="1"/>
             <a:r>
               <a:rPr lang="en-GB" noProof="0" dirty="0"/>
               <a:t>Add the Matlab files folder to the Matlab path</a:t>
             </a:r>
           </a:p>
           <a:p>
-            <a:pPr lvl="1"/>
+            <a:pPr lvl="2"/>
             <a:r>
               <a:rPr lang="en-GB" noProof="0" dirty="0" err="1"/>
               <a:t>addpath</a:t>
@@ -6139,6 +6445,66 @@
               <a:buNone/>
             </a:pPr>
             <a:endParaRPr lang="en-GB" noProof="0" dirty="0"/>
+          </a:p>
+        </p:txBody>
+      </p:sp>
+      <p:sp>
+        <p:nvSpPr>
+          <p:cNvPr id="4" name="TextBox 3">
+            <a:extLst>
+              <a:ext uri="{FF2B5EF4-FFF2-40B4-BE49-F238E27FC236}">
+                <a16:creationId xmlns:a16="http://schemas.microsoft.com/office/drawing/2014/main" id="{DBEBE9F0-73BC-BF41-D3AC-FA3957F4A30F}"/>
+              </a:ext>
+            </a:extLst>
+          </p:cNvPr>
+          <p:cNvSpPr txBox="1"/>
+          <p:nvPr/>
+        </p:nvSpPr>
+        <p:spPr>
+          <a:xfrm>
+            <a:off x="734290" y="5661878"/>
+            <a:ext cx="10328564" cy="830997"/>
+          </a:xfrm>
+          <a:prstGeom prst="rect">
+            <a:avLst/>
+          </a:prstGeom>
+          <a:noFill/>
+        </p:spPr>
+        <p:txBody>
+          <a:bodyPr wrap="square" rtlCol="0">
+            <a:spAutoFit/>
+          </a:bodyPr>
+          <a:lstStyle/>
+          <a:p>
+            <a:r>
+              <a:rPr lang="nb-NO" sz="1600" dirty="0"/>
+              <a:t>On my PC:</a:t>
+            </a:r>
+          </a:p>
+          <a:p>
+            <a:r>
+              <a:rPr lang="en-GB" sz="1600" dirty="0">
+                <a:latin typeface="Consolas" panose="020B0609020204030204" pitchFamily="49" charset="0"/>
+              </a:rPr>
+              <a:t>cd C:\Users\are\OneDrive\Chile\Summer_school</a:t>
+            </a:r>
+            <a:endParaRPr lang="nb-NO" sz="1600" dirty="0">
+              <a:latin typeface="Consolas" panose="020B0609020204030204" pitchFamily="49" charset="0"/>
+            </a:endParaRPr>
+          </a:p>
+          <a:p>
+            <a:r>
+              <a:rPr lang="en-GB" sz="1600" dirty="0" err="1">
+                <a:latin typeface="Consolas" panose="020B0609020204030204" pitchFamily="49" charset="0"/>
+              </a:rPr>
+              <a:t>addpath</a:t>
+            </a:r>
+            <a:r>
+              <a:rPr lang="en-GB" sz="1600" dirty="0">
+                <a:latin typeface="Consolas" panose="020B0609020204030204" pitchFamily="49" charset="0"/>
+              </a:rPr>
+              <a:t> C:\Users\are\OneDrive\Documents\GitHub\OpticalTweezers</a:t>
+            </a:r>
           </a:p>
         </p:txBody>
       </p:sp>
@@ -6146,6 +6512,323 @@
     <p:extLst>
       <p:ext uri="{BB962C8B-B14F-4D97-AF65-F5344CB8AC3E}">
         <p14:creationId xmlns:p14="http://schemas.microsoft.com/office/powerpoint/2010/main" val="855437036"/>
+      </p:ext>
+    </p:extLst>
+  </p:cSld>
+  <p:clrMapOvr>
+    <a:masterClrMapping/>
+  </p:clrMapOvr>
+</p:sld>
+</file>
+
+<file path=ppt/slides/slide20.xml><?xml version="1.0" encoding="utf-8"?>
+<p:sld xmlns:a="http://schemas.openxmlformats.org/drawingml/2006/main" xmlns:r="http://schemas.openxmlformats.org/officeDocument/2006/relationships" xmlns:p="http://schemas.openxmlformats.org/presentationml/2006/main">
+  <p:cSld>
+    <p:spTree>
+      <p:nvGrpSpPr>
+        <p:cNvPr id="1" name=""/>
+        <p:cNvGrpSpPr/>
+        <p:nvPr/>
+      </p:nvGrpSpPr>
+      <p:grpSpPr>
+        <a:xfrm>
+          <a:off x="0" y="0"/>
+          <a:ext cx="0" cy="0"/>
+          <a:chOff x="0" y="0"/>
+          <a:chExt cx="0" cy="0"/>
+        </a:xfrm>
+      </p:grpSpPr>
+      <p:sp>
+        <p:nvSpPr>
+          <p:cNvPr id="2" name="Title 1">
+            <a:extLst>
+              <a:ext uri="{FF2B5EF4-FFF2-40B4-BE49-F238E27FC236}">
+                <a16:creationId xmlns:a16="http://schemas.microsoft.com/office/drawing/2014/main" id="{5026A303-801F-D02A-EBE5-961D86273945}"/>
+              </a:ext>
+            </a:extLst>
+          </p:cNvPr>
+          <p:cNvSpPr>
+            <a:spLocks noGrp="1"/>
+          </p:cNvSpPr>
+          <p:nvPr>
+            <p:ph type="title"/>
+          </p:nvPr>
+        </p:nvSpPr>
+        <p:spPr/>
+        <p:txBody>
+          <a:bodyPr>
+            <a:normAutofit/>
+          </a:bodyPr>
+          <a:lstStyle/>
+          <a:p>
+            <a:pPr lvl="1"/>
+            <a:r>
+              <a:rPr lang="en-GB" sz="3600" dirty="0"/>
+              <a:t>Help needed!</a:t>
+            </a:r>
+          </a:p>
+        </p:txBody>
+      </p:sp>
+      <p:sp>
+        <p:nvSpPr>
+          <p:cNvPr id="3" name="Content Placeholder 2">
+            <a:extLst>
+              <a:ext uri="{FF2B5EF4-FFF2-40B4-BE49-F238E27FC236}">
+                <a16:creationId xmlns:a16="http://schemas.microsoft.com/office/drawing/2014/main" id="{D3A57773-0ED5-BABD-9ED7-8C7E2A692B3B}"/>
+              </a:ext>
+            </a:extLst>
+          </p:cNvPr>
+          <p:cNvSpPr>
+            <a:spLocks noGrp="1"/>
+          </p:cNvSpPr>
+          <p:nvPr>
+            <p:ph idx="1"/>
+          </p:nvPr>
+        </p:nvSpPr>
+        <p:spPr/>
+        <p:txBody>
+          <a:bodyPr>
+            <a:normAutofit lnSpcReduction="10000"/>
+          </a:bodyPr>
+          <a:lstStyle/>
+          <a:p>
+            <a:r>
+              <a:rPr lang="en-GB" dirty="0"/>
+              <a:t>The Matlab programs have a single author</a:t>
+            </a:r>
+          </a:p>
+          <a:p>
+            <a:r>
+              <a:rPr lang="en-GB" dirty="0"/>
+              <a:t>Need new blood!</a:t>
+            </a:r>
+          </a:p>
+          <a:p>
+            <a:pPr lvl="1"/>
+            <a:r>
+              <a:rPr lang="en-GB" dirty="0"/>
+              <a:t>Two minds think better that one!</a:t>
+            </a:r>
+          </a:p>
+          <a:p>
+            <a:pPr lvl="1"/>
+            <a:r>
+              <a:rPr lang="en-GB" dirty="0"/>
+              <a:t>There are probably better ways to do many things</a:t>
+            </a:r>
+          </a:p>
+          <a:p>
+            <a:pPr lvl="1"/>
+            <a:r>
+              <a:rPr lang="en-GB" dirty="0"/>
+              <a:t>I am getting old!</a:t>
+            </a:r>
+          </a:p>
+          <a:p>
+            <a:pPr marL="0" indent="0">
+              <a:buNone/>
+            </a:pPr>
+            <a:endParaRPr lang="en-GB" dirty="0"/>
+          </a:p>
+          <a:p>
+            <a:r>
+              <a:rPr lang="en-GB" dirty="0"/>
+              <a:t>Interested in helping with program development and maintenance?</a:t>
+            </a:r>
+          </a:p>
+          <a:p>
+            <a:pPr lvl="1"/>
+            <a:r>
+              <a:rPr lang="en-GB" dirty="0"/>
+              <a:t>Please contact Christian Wilson or me.</a:t>
+            </a:r>
+          </a:p>
+          <a:p>
+            <a:pPr lvl="1"/>
+            <a:r>
+              <a:rPr lang="en-GB" dirty="0"/>
+              <a:t>For my Email address, please type: </a:t>
+            </a:r>
+            <a:r>
+              <a:rPr lang="en-GB" dirty="0" err="1">
+                <a:latin typeface="Consolas" panose="020B0609020204030204" pitchFamily="49" charset="0"/>
+              </a:rPr>
+              <a:t>contact_details</a:t>
+            </a:r>
+            <a:r>
+              <a:rPr lang="en-GB" dirty="0"/>
+              <a:t> in Matlab</a:t>
+            </a:r>
+          </a:p>
+          <a:p>
+            <a:pPr marL="0" indent="0">
+              <a:buNone/>
+            </a:pPr>
+            <a:endParaRPr lang="en-GB" dirty="0"/>
+          </a:p>
+        </p:txBody>
+      </p:sp>
+    </p:spTree>
+    <p:extLst>
+      <p:ext uri="{BB962C8B-B14F-4D97-AF65-F5344CB8AC3E}">
+        <p14:creationId xmlns:p14="http://schemas.microsoft.com/office/powerpoint/2010/main" val="859442970"/>
+      </p:ext>
+    </p:extLst>
+  </p:cSld>
+  <p:clrMapOvr>
+    <a:masterClrMapping/>
+  </p:clrMapOvr>
+</p:sld>
+</file>
+
+<file path=ppt/slides/slide21.xml><?xml version="1.0" encoding="utf-8"?>
+<p:sld xmlns:a="http://schemas.openxmlformats.org/drawingml/2006/main" xmlns:r="http://schemas.openxmlformats.org/officeDocument/2006/relationships" xmlns:p="http://schemas.openxmlformats.org/presentationml/2006/main">
+  <p:cSld>
+    <p:spTree>
+      <p:nvGrpSpPr>
+        <p:cNvPr id="1" name=""/>
+        <p:cNvGrpSpPr/>
+        <p:nvPr/>
+      </p:nvGrpSpPr>
+      <p:grpSpPr>
+        <a:xfrm>
+          <a:off x="0" y="0"/>
+          <a:ext cx="0" cy="0"/>
+          <a:chOff x="0" y="0"/>
+          <a:chExt cx="0" cy="0"/>
+        </a:xfrm>
+      </p:grpSpPr>
+      <p:sp>
+        <p:nvSpPr>
+          <p:cNvPr id="2" name="Title 1">
+            <a:extLst>
+              <a:ext uri="{FF2B5EF4-FFF2-40B4-BE49-F238E27FC236}">
+                <a16:creationId xmlns:a16="http://schemas.microsoft.com/office/drawing/2014/main" id="{8B0992E7-B0C7-2C56-A2B6-4FC198958449}"/>
+              </a:ext>
+            </a:extLst>
+          </p:cNvPr>
+          <p:cNvSpPr>
+            <a:spLocks noGrp="1"/>
+          </p:cNvSpPr>
+          <p:nvPr>
+            <p:ph type="title"/>
+          </p:nvPr>
+        </p:nvSpPr>
+        <p:spPr/>
+        <p:txBody>
+          <a:bodyPr/>
+          <a:lstStyle/>
+          <a:p>
+            <a:r>
+              <a:rPr lang="en-GB" dirty="0"/>
+              <a:t>Alternative </a:t>
+            </a:r>
+            <a:r>
+              <a:rPr lang="en-GB" dirty="0" err="1"/>
+              <a:t>experiment</a:t>
+            </a:r>
+            <a:r>
+              <a:rPr lang="en-GB" dirty="0"/>
+              <a:t> files</a:t>
+            </a:r>
+          </a:p>
+        </p:txBody>
+      </p:sp>
+      <p:sp>
+        <p:nvSpPr>
+          <p:cNvPr id="3" name="Content Placeholder 2">
+            <a:extLst>
+              <a:ext uri="{FF2B5EF4-FFF2-40B4-BE49-F238E27FC236}">
+                <a16:creationId xmlns:a16="http://schemas.microsoft.com/office/drawing/2014/main" id="{81EEE489-96AC-F7FB-E416-69DE36551EA5}"/>
+              </a:ext>
+            </a:extLst>
+          </p:cNvPr>
+          <p:cNvSpPr>
+            <a:spLocks noGrp="1"/>
+          </p:cNvSpPr>
+          <p:nvPr>
+            <p:ph idx="1"/>
+          </p:nvPr>
+        </p:nvSpPr>
+        <p:spPr>
+          <a:xfrm>
+            <a:off x="710878" y="1524683"/>
+            <a:ext cx="10515600" cy="4351338"/>
+          </a:xfrm>
+        </p:spPr>
+        <p:txBody>
+          <a:bodyPr/>
+          <a:lstStyle/>
+          <a:p>
+            <a:r>
+              <a:rPr lang="en-GB" dirty="0" err="1"/>
+              <a:t>You</a:t>
+            </a:r>
+            <a:r>
+              <a:rPr lang="en-GB" dirty="0"/>
+              <a:t> </a:t>
+            </a:r>
+            <a:r>
+              <a:rPr lang="en-GB" dirty="0" err="1"/>
+              <a:t>may</a:t>
+            </a:r>
+            <a:r>
+              <a:rPr lang="en-GB" dirty="0"/>
+              <a:t> </a:t>
+            </a:r>
+            <a:r>
+              <a:rPr lang="en-GB" dirty="0" err="1"/>
+              <a:t>create</a:t>
+            </a:r>
+            <a:r>
+              <a:rPr lang="en-GB" dirty="0"/>
+              <a:t> </a:t>
+            </a:r>
+            <a:r>
+              <a:rPr lang="en-GB" dirty="0" err="1"/>
+              <a:t>another</a:t>
+            </a:r>
+            <a:r>
+              <a:rPr lang="en-GB" dirty="0"/>
+              <a:t> subfolder ‘</a:t>
+            </a:r>
+            <a:r>
+              <a:rPr lang="en-GB" dirty="0" err="1"/>
+              <a:t>testfiles</a:t>
+            </a:r>
+            <a:r>
+              <a:rPr lang="en-GB" dirty="0"/>
+              <a:t>’ to store </a:t>
+            </a:r>
+            <a:r>
+              <a:rPr lang="en-GB" dirty="0" err="1"/>
+              <a:t>the</a:t>
+            </a:r>
+            <a:r>
+              <a:rPr lang="en-GB" dirty="0"/>
+              <a:t> files in Testfiles.zip in </a:t>
+            </a:r>
+            <a:r>
+              <a:rPr lang="en-GB" dirty="0" err="1"/>
+              <a:t>the</a:t>
+            </a:r>
+            <a:r>
+              <a:rPr lang="en-GB" dirty="0"/>
+              <a:t> ‘Summer school 2024’ folder</a:t>
+            </a:r>
+          </a:p>
+          <a:p>
+            <a:r>
+              <a:rPr lang="en-GB" dirty="0"/>
+              <a:t>I refer to some of those files on a few occasions, to make sure some files had relevant features.  Probably we can find those features in the files you got by mail</a:t>
+            </a:r>
+          </a:p>
+        </p:txBody>
+      </p:sp>
+    </p:spTree>
+    <p:extLst>
+      <p:ext uri="{BB962C8B-B14F-4D97-AF65-F5344CB8AC3E}">
+        <p14:creationId xmlns:p14="http://schemas.microsoft.com/office/powerpoint/2010/main" val="2035280032"/>
       </p:ext>
     </p:extLst>
   </p:cSld>
@@ -6576,10 +7259,10 @@
       </p:grpSpPr>
       <p:sp>
         <p:nvSpPr>
-          <p:cNvPr id="2" name="Title 1">
-            <a:extLst>
-              <a:ext uri="{FF2B5EF4-FFF2-40B4-BE49-F238E27FC236}">
-                <a16:creationId xmlns:a16="http://schemas.microsoft.com/office/drawing/2014/main" id="{8B0992E7-B0C7-2C56-A2B6-4FC198958449}"/>
+          <p:cNvPr id="4" name="Title 3">
+            <a:extLst>
+              <a:ext uri="{FF2B5EF4-FFF2-40B4-BE49-F238E27FC236}">
+                <a16:creationId xmlns:a16="http://schemas.microsoft.com/office/drawing/2014/main" id="{393E523C-9FF8-5DBF-807E-15E9F0360A43}"/>
               </a:ext>
             </a:extLst>
           </p:cNvPr>
@@ -6597,114 +7280,291 @@
           <a:p>
             <a:r>
               <a:rPr lang="en-GB" dirty="0"/>
-              <a:t>Alternative </a:t>
-            </a:r>
-            <a:r>
-              <a:rPr lang="en-GB" dirty="0" err="1"/>
-              <a:t>experiment</a:t>
-            </a:r>
-            <a:r>
-              <a:rPr lang="en-GB" dirty="0"/>
-              <a:t> files</a:t>
-            </a:r>
-          </a:p>
-        </p:txBody>
-      </p:sp>
-      <p:sp>
-        <p:nvSpPr>
-          <p:cNvPr id="3" name="Content Placeholder 2">
-            <a:extLst>
-              <a:ext uri="{FF2B5EF4-FFF2-40B4-BE49-F238E27FC236}">
-                <a16:creationId xmlns:a16="http://schemas.microsoft.com/office/drawing/2014/main" id="{81EEE489-96AC-F7FB-E416-69DE36551EA5}"/>
-              </a:ext>
-            </a:extLst>
-          </p:cNvPr>
-          <p:cNvSpPr>
-            <a:spLocks noGrp="1"/>
-          </p:cNvSpPr>
-          <p:nvPr>
-            <p:ph idx="1"/>
-          </p:nvPr>
+              <a:t>Experiment data file</a:t>
+            </a:r>
+          </a:p>
+        </p:txBody>
+      </p:sp>
+      <p:sp>
+        <p:nvSpPr>
+          <p:cNvPr id="7" name="TextBox 6">
+            <a:extLst>
+              <a:ext uri="{FF2B5EF4-FFF2-40B4-BE49-F238E27FC236}">
+                <a16:creationId xmlns:a16="http://schemas.microsoft.com/office/drawing/2014/main" id="{C29B2822-7DAF-7BFC-0148-8FC599CCFF99}"/>
+              </a:ext>
+            </a:extLst>
+          </p:cNvPr>
+          <p:cNvSpPr txBox="1"/>
+          <p:nvPr/>
+        </p:nvSpPr>
+        <p:spPr>
+          <a:xfrm rot="17788890">
+            <a:off x="1520655" y="4722142"/>
+            <a:ext cx="2032717" cy="369332"/>
+          </a:xfrm>
+          <a:prstGeom prst="rect">
+            <a:avLst/>
+          </a:prstGeom>
+          <a:noFill/>
+        </p:spPr>
+        <p:txBody>
+          <a:bodyPr wrap="square" rtlCol="0">
+            <a:spAutoFit/>
+          </a:bodyPr>
+          <a:lstStyle/>
+          <a:p>
+            <a:r>
+              <a:rPr lang="en-GB" dirty="0">
+                <a:solidFill>
+                  <a:srgbClr val="FF0000"/>
+                </a:solidFill>
+              </a:rPr>
+              <a:t>seconds*4000</a:t>
+            </a:r>
+          </a:p>
+        </p:txBody>
+      </p:sp>
+      <p:sp>
+        <p:nvSpPr>
+          <p:cNvPr id="8" name="TextBox 7">
+            <a:extLst>
+              <a:ext uri="{FF2B5EF4-FFF2-40B4-BE49-F238E27FC236}">
+                <a16:creationId xmlns:a16="http://schemas.microsoft.com/office/drawing/2014/main" id="{CEA45F0C-FBAE-4F68-622E-0AA965AEF51E}"/>
+              </a:ext>
+            </a:extLst>
+          </p:cNvPr>
+          <p:cNvSpPr txBox="1"/>
+          <p:nvPr/>
+        </p:nvSpPr>
+        <p:spPr>
+          <a:xfrm rot="17788890">
+            <a:off x="2927129" y="4896473"/>
+            <a:ext cx="2422247" cy="369332"/>
+          </a:xfrm>
+          <a:prstGeom prst="rect">
+            <a:avLst/>
+          </a:prstGeom>
+          <a:noFill/>
+        </p:spPr>
+        <p:txBody>
+          <a:bodyPr wrap="square" rtlCol="0">
+            <a:spAutoFit/>
+          </a:bodyPr>
+          <a:lstStyle/>
+          <a:p>
+            <a:r>
+              <a:rPr lang="en-GB" dirty="0">
+                <a:solidFill>
+                  <a:srgbClr val="FF0000"/>
+                </a:solidFill>
+              </a:rPr>
+              <a:t>(minus) Force (</a:t>
+            </a:r>
+            <a:r>
+              <a:rPr lang="en-GB" dirty="0" err="1">
+                <a:solidFill>
+                  <a:srgbClr val="FF0000"/>
+                </a:solidFill>
+              </a:rPr>
+              <a:t>pN</a:t>
+            </a:r>
+            <a:r>
+              <a:rPr lang="en-GB" dirty="0">
+                <a:solidFill>
+                  <a:srgbClr val="FF0000"/>
+                </a:solidFill>
+              </a:rPr>
+              <a:t>)</a:t>
+            </a:r>
+          </a:p>
+        </p:txBody>
+      </p:sp>
+      <p:sp>
+        <p:nvSpPr>
+          <p:cNvPr id="9" name="TextBox 8">
+            <a:extLst>
+              <a:ext uri="{FF2B5EF4-FFF2-40B4-BE49-F238E27FC236}">
+                <a16:creationId xmlns:a16="http://schemas.microsoft.com/office/drawing/2014/main" id="{71E2011A-6411-D281-8C31-42CDB8C2C2B1}"/>
+              </a:ext>
+            </a:extLst>
+          </p:cNvPr>
+          <p:cNvSpPr txBox="1"/>
+          <p:nvPr/>
+        </p:nvSpPr>
+        <p:spPr>
+          <a:xfrm rot="17788890">
+            <a:off x="4709375" y="4974792"/>
+            <a:ext cx="2451570" cy="369332"/>
+          </a:xfrm>
+          <a:prstGeom prst="rect">
+            <a:avLst/>
+          </a:prstGeom>
+          <a:noFill/>
+        </p:spPr>
+        <p:txBody>
+          <a:bodyPr wrap="square" rtlCol="0">
+            <a:spAutoFit/>
+          </a:bodyPr>
+          <a:lstStyle/>
+          <a:p>
+            <a:r>
+              <a:rPr lang="en-GB" dirty="0">
+                <a:solidFill>
+                  <a:srgbClr val="FF0000"/>
+                </a:solidFill>
+              </a:rPr>
+              <a:t>(minus) Trap pos.  A</a:t>
+            </a:r>
+          </a:p>
+        </p:txBody>
+      </p:sp>
+      <p:sp>
+        <p:nvSpPr>
+          <p:cNvPr id="16" name="TextBox 15">
+            <a:extLst>
+              <a:ext uri="{FF2B5EF4-FFF2-40B4-BE49-F238E27FC236}">
+                <a16:creationId xmlns:a16="http://schemas.microsoft.com/office/drawing/2014/main" id="{B7C652D4-8A1C-53A7-7DE6-94BA871903B3}"/>
+              </a:ext>
+            </a:extLst>
+          </p:cNvPr>
+          <p:cNvSpPr txBox="1"/>
+          <p:nvPr/>
+        </p:nvSpPr>
+        <p:spPr>
+          <a:xfrm rot="17788890">
+            <a:off x="5711829" y="5061835"/>
+            <a:ext cx="2192522" cy="369332"/>
+          </a:xfrm>
+          <a:prstGeom prst="rect">
+            <a:avLst/>
+          </a:prstGeom>
+          <a:noFill/>
+        </p:spPr>
+        <p:txBody>
+          <a:bodyPr wrap="square" rtlCol="0">
+            <a:spAutoFit/>
+          </a:bodyPr>
+          <a:lstStyle/>
+          <a:p>
+            <a:r>
+              <a:rPr lang="en-GB" dirty="0">
+                <a:solidFill>
+                  <a:srgbClr val="FF0000"/>
+                </a:solidFill>
+              </a:rPr>
+              <a:t>(minus) Trap pos.  B</a:t>
+            </a:r>
+          </a:p>
+        </p:txBody>
+      </p:sp>
+      <p:sp>
+        <p:nvSpPr>
+          <p:cNvPr id="17" name="TextBox 16">
+            <a:extLst>
+              <a:ext uri="{FF2B5EF4-FFF2-40B4-BE49-F238E27FC236}">
+                <a16:creationId xmlns:a16="http://schemas.microsoft.com/office/drawing/2014/main" id="{9DFCE763-CF36-557C-1769-93EA11A1FF0E}"/>
+              </a:ext>
+            </a:extLst>
+          </p:cNvPr>
+          <p:cNvSpPr txBox="1"/>
+          <p:nvPr/>
+        </p:nvSpPr>
+        <p:spPr>
+          <a:xfrm rot="17788890">
+            <a:off x="6878270" y="5153254"/>
+            <a:ext cx="1988253" cy="369332"/>
+          </a:xfrm>
+          <a:prstGeom prst="rect">
+            <a:avLst/>
+          </a:prstGeom>
+          <a:noFill/>
+        </p:spPr>
+        <p:txBody>
+          <a:bodyPr wrap="square" rtlCol="0">
+            <a:spAutoFit/>
+          </a:bodyPr>
+          <a:lstStyle/>
+          <a:p>
+            <a:r>
+              <a:rPr lang="en-GB" dirty="0">
+                <a:solidFill>
+                  <a:srgbClr val="FF0000"/>
+                </a:solidFill>
+              </a:rPr>
+              <a:t>Temperature code</a:t>
+            </a:r>
+          </a:p>
+        </p:txBody>
+      </p:sp>
+      <p:sp>
+        <p:nvSpPr>
+          <p:cNvPr id="18" name="TextBox 17">
+            <a:extLst>
+              <a:ext uri="{FF2B5EF4-FFF2-40B4-BE49-F238E27FC236}">
+                <a16:creationId xmlns:a16="http://schemas.microsoft.com/office/drawing/2014/main" id="{AFF007E3-6BCE-3E8C-5621-27522A29897F}"/>
+              </a:ext>
+            </a:extLst>
+          </p:cNvPr>
+          <p:cNvSpPr txBox="1"/>
+          <p:nvPr/>
         </p:nvSpPr>
         <p:spPr>
           <a:xfrm>
-            <a:off x="710878" y="1524683"/>
-            <a:ext cx="10515600" cy="4351338"/>
+            <a:off x="8641080" y="4636008"/>
+            <a:ext cx="2712720" cy="646331"/>
           </a:xfrm>
+          <a:prstGeom prst="rect">
+            <a:avLst/>
+          </a:prstGeom>
+          <a:noFill/>
         </p:spPr>
         <p:txBody>
-          <a:bodyPr/>
-          <a:lstStyle/>
-          <a:p>
-            <a:r>
-              <a:rPr lang="en-GB" dirty="0" err="1"/>
-              <a:t>You</a:t>
-            </a:r>
-            <a:r>
-              <a:rPr lang="en-GB" dirty="0"/>
-              <a:t> </a:t>
-            </a:r>
-            <a:r>
-              <a:rPr lang="en-GB" dirty="0" err="1"/>
-              <a:t>may</a:t>
-            </a:r>
-            <a:r>
-              <a:rPr lang="en-GB" dirty="0"/>
-              <a:t> </a:t>
-            </a:r>
-            <a:r>
-              <a:rPr lang="en-GB" dirty="0" err="1"/>
-              <a:t>create</a:t>
-            </a:r>
-            <a:r>
-              <a:rPr lang="en-GB" dirty="0"/>
-              <a:t> </a:t>
-            </a:r>
-            <a:r>
-              <a:rPr lang="en-GB" dirty="0" err="1"/>
-              <a:t>another</a:t>
-            </a:r>
-            <a:r>
-              <a:rPr lang="en-GB" dirty="0"/>
-              <a:t> subfolder ‘</a:t>
-            </a:r>
-            <a:r>
-              <a:rPr lang="en-GB" dirty="0" err="1"/>
-              <a:t>testfiles</a:t>
-            </a:r>
-            <a:r>
-              <a:rPr lang="en-GB" dirty="0"/>
-              <a:t>’ to store </a:t>
-            </a:r>
-            <a:r>
-              <a:rPr lang="en-GB" dirty="0" err="1"/>
-              <a:t>the</a:t>
-            </a:r>
-            <a:r>
-              <a:rPr lang="en-GB" dirty="0"/>
-              <a:t> files in Testfiles.zip in </a:t>
-            </a:r>
-            <a:r>
-              <a:rPr lang="en-GB" dirty="0" err="1"/>
-              <a:t>the</a:t>
-            </a:r>
-            <a:r>
-              <a:rPr lang="en-GB" dirty="0"/>
-              <a:t> ‘Summer school 2024’ folder</a:t>
-            </a:r>
-          </a:p>
-          <a:p>
-            <a:r>
-              <a:rPr lang="en-GB" dirty="0"/>
-              <a:t>I refer to some of those files on a few occasions, to make sure some files had relevant features.  Probably we can find those features in the files you got by mail</a:t>
-            </a:r>
-          </a:p>
-        </p:txBody>
-      </p:sp>
+          <a:bodyPr wrap="square" rtlCol="0">
+            <a:spAutoFit/>
+          </a:bodyPr>
+          <a:lstStyle/>
+          <a:p>
+            <a:r>
+              <a:rPr lang="en-GB" dirty="0"/>
+              <a:t>Use mean of trap positions A and B</a:t>
+            </a:r>
+          </a:p>
+        </p:txBody>
+      </p:sp>
+      <p:pic>
+        <p:nvPicPr>
+          <p:cNvPr id="6" name="Picture 5">
+            <a:extLst>
+              <a:ext uri="{FF2B5EF4-FFF2-40B4-BE49-F238E27FC236}">
+                <a16:creationId xmlns:a16="http://schemas.microsoft.com/office/drawing/2014/main" id="{201299D0-A784-5AAC-CD78-C2754EE888EF}"/>
+              </a:ext>
+            </a:extLst>
+          </p:cNvPr>
+          <p:cNvPicPr>
+            <a:picLocks noChangeAspect="1"/>
+          </p:cNvPicPr>
+          <p:nvPr/>
+        </p:nvPicPr>
+        <p:blipFill>
+          <a:blip r:embed="rId2"/>
+          <a:stretch>
+            <a:fillRect/>
+          </a:stretch>
+        </p:blipFill>
+        <p:spPr>
+          <a:xfrm>
+            <a:off x="2264142" y="1333465"/>
+            <a:ext cx="8440328" cy="2962688"/>
+          </a:xfrm>
+          <a:prstGeom prst="rect">
+            <a:avLst/>
+          </a:prstGeom>
+        </p:spPr>
+      </p:pic>
     </p:spTree>
     <p:extLst>
       <p:ext uri="{BB962C8B-B14F-4D97-AF65-F5344CB8AC3E}">
-        <p14:creationId xmlns:p14="http://schemas.microsoft.com/office/powerpoint/2010/main" val="2035280032"/>
+        <p14:creationId xmlns:p14="http://schemas.microsoft.com/office/powerpoint/2010/main" val="2324055941"/>
       </p:ext>
     </p:extLst>
   </p:cSld>
@@ -6733,10 +7593,10 @@
       </p:grpSpPr>
       <p:sp>
         <p:nvSpPr>
-          <p:cNvPr id="4" name="Title 3">
-            <a:extLst>
-              <a:ext uri="{FF2B5EF4-FFF2-40B4-BE49-F238E27FC236}">
-                <a16:creationId xmlns:a16="http://schemas.microsoft.com/office/drawing/2014/main" id="{393E523C-9FF8-5DBF-807E-15E9F0360A43}"/>
+          <p:cNvPr id="2" name="Title 1">
+            <a:extLst>
+              <a:ext uri="{FF2B5EF4-FFF2-40B4-BE49-F238E27FC236}">
+                <a16:creationId xmlns:a16="http://schemas.microsoft.com/office/drawing/2014/main" id="{DB7F49CA-6496-E90F-C8F5-AF667565FD24}"/>
               </a:ext>
             </a:extLst>
           </p:cNvPr>
@@ -6754,386 +7614,216 @@
           <a:p>
             <a:r>
               <a:rPr lang="en-GB" dirty="0"/>
-              <a:t>Experiment data file</a:t>
-            </a:r>
-          </a:p>
-        </p:txBody>
-      </p:sp>
-      <p:sp>
-        <p:nvSpPr>
-          <p:cNvPr id="7" name="TextBox 6">
-            <a:extLst>
-              <a:ext uri="{FF2B5EF4-FFF2-40B4-BE49-F238E27FC236}">
-                <a16:creationId xmlns:a16="http://schemas.microsoft.com/office/drawing/2014/main" id="{C29B2822-7DAF-7BFC-0148-8FC599CCFF99}"/>
-              </a:ext>
-            </a:extLst>
-          </p:cNvPr>
-          <p:cNvSpPr txBox="1"/>
-          <p:nvPr/>
-        </p:nvSpPr>
-        <p:spPr>
-          <a:xfrm rot="17788890">
-            <a:off x="1520655" y="4722142"/>
-            <a:ext cx="2032717" cy="369332"/>
-          </a:xfrm>
-          <a:prstGeom prst="rect">
-            <a:avLst/>
-          </a:prstGeom>
-          <a:noFill/>
-        </p:spPr>
-        <p:txBody>
-          <a:bodyPr wrap="square" rtlCol="0">
-            <a:spAutoFit/>
+              <a:t>Reading an experiment file</a:t>
+            </a:r>
+          </a:p>
+        </p:txBody>
+      </p:sp>
+      <p:sp>
+        <p:nvSpPr>
+          <p:cNvPr id="3" name="Content Placeholder 2">
+            <a:extLst>
+              <a:ext uri="{FF2B5EF4-FFF2-40B4-BE49-F238E27FC236}">
+                <a16:creationId xmlns:a16="http://schemas.microsoft.com/office/drawing/2014/main" id="{EB4D6777-D1FB-FA52-F6AF-67F4665F7DD9}"/>
+              </a:ext>
+            </a:extLst>
+          </p:cNvPr>
+          <p:cNvSpPr>
+            <a:spLocks noGrp="1"/>
+          </p:cNvSpPr>
+          <p:nvPr>
+            <p:ph idx="1"/>
+          </p:nvPr>
+        </p:nvSpPr>
+        <p:spPr/>
+        <p:txBody>
+          <a:bodyPr>
+            <a:normAutofit/>
           </a:bodyPr>
           <a:lstStyle/>
           <a:p>
             <a:r>
+              <a:rPr lang="en-GB" sz="1800" b="0" i="0" dirty="0">
+                <a:effectLst/>
+                <a:latin typeface="Consolas" panose="020B0609020204030204" pitchFamily="49" charset="0"/>
+              </a:rPr>
+              <a:t>[</a:t>
+            </a:r>
+            <a:r>
+              <a:rPr lang="en-GB" sz="1800" b="0" i="0" dirty="0" err="1">
+                <a:effectLst/>
+                <a:latin typeface="Consolas" panose="020B0609020204030204" pitchFamily="49" charset="0"/>
+              </a:rPr>
+              <a:t>t,f,x,T</a:t>
+            </a:r>
+            <a:r>
+              <a:rPr lang="en-GB" sz="1800" b="0" i="0" dirty="0">
+                <a:effectLst/>
+                <a:latin typeface="Consolas" panose="020B0609020204030204" pitchFamily="49" charset="0"/>
+              </a:rPr>
+              <a:t>] = </a:t>
+            </a:r>
+            <a:r>
+              <a:rPr lang="en-GB" sz="1800" b="0" i="0" dirty="0" err="1">
+                <a:effectLst/>
+                <a:latin typeface="Consolas" panose="020B0609020204030204" pitchFamily="49" charset="0"/>
+              </a:rPr>
+              <a:t>read_experiment_file</a:t>
+            </a:r>
+            <a:r>
+              <a:rPr lang="en-GB" sz="1800" b="0" i="0" dirty="0">
+                <a:effectLst/>
+                <a:latin typeface="Consolas" panose="020B0609020204030204" pitchFamily="49" charset="0"/>
+              </a:rPr>
+              <a:t>(file);</a:t>
+            </a:r>
+          </a:p>
+          <a:p>
+            <a:r>
+              <a:rPr lang="en-GB" sz="1800" b="0" i="0" dirty="0">
+                <a:effectLst/>
+                <a:latin typeface="Consolas" panose="020B0609020204030204" pitchFamily="49" charset="0"/>
+              </a:rPr>
+              <a:t>[</a:t>
+            </a:r>
+            <a:r>
+              <a:rPr lang="en-GB" sz="1800" b="0" i="0" dirty="0" err="1">
+                <a:effectLst/>
+                <a:latin typeface="Consolas" panose="020B0609020204030204" pitchFamily="49" charset="0"/>
+              </a:rPr>
+              <a:t>t,f,x,T</a:t>
+            </a:r>
+            <a:r>
+              <a:rPr lang="en-GB" sz="1800" b="0" i="0" dirty="0">
+                <a:effectLst/>
+                <a:latin typeface="Consolas" panose="020B0609020204030204" pitchFamily="49" charset="0"/>
+              </a:rPr>
+              <a:t>] = </a:t>
+            </a:r>
+            <a:r>
+              <a:rPr lang="en-GB" sz="1800" b="0" i="0" dirty="0" err="1">
+                <a:effectLst/>
+                <a:latin typeface="Consolas" panose="020B0609020204030204" pitchFamily="49" charset="0"/>
+              </a:rPr>
+              <a:t>read_experiment_file</a:t>
+            </a:r>
+            <a:r>
+              <a:rPr lang="en-GB" sz="1800" dirty="0">
+                <a:latin typeface="Consolas" panose="020B0609020204030204" pitchFamily="49" charset="0"/>
+              </a:rPr>
+              <a:t>('</a:t>
+            </a:r>
+            <a:r>
+              <a:rPr lang="en-GB" sz="1800" b="0" i="0" dirty="0">
+                <a:effectLst/>
+                <a:latin typeface="Consolas" panose="020B0609020204030204" pitchFamily="49" charset="0"/>
+              </a:rPr>
+              <a:t>aA.txt');</a:t>
+            </a:r>
+          </a:p>
+          <a:p>
+            <a:endParaRPr lang="en-GB" sz="1800" b="0" i="0" dirty="0">
+              <a:effectLst/>
+              <a:latin typeface="Consolas" panose="020B0609020204030204" pitchFamily="49" charset="0"/>
+            </a:endParaRPr>
+          </a:p>
+          <a:p>
+            <a:r>
+              <a:rPr lang="en-GB" dirty="0"/>
+              <a:t>Inputs:</a:t>
+            </a:r>
+          </a:p>
+          <a:p>
+            <a:pPr lvl="1"/>
+            <a:r>
+              <a:rPr lang="en-GB" dirty="0"/>
+              <a:t>file: </a:t>
+            </a:r>
+            <a:r>
+              <a:rPr lang="en-GB" sz="2200" dirty="0">
+                <a:latin typeface="Consolas" panose="020B0609020204030204" pitchFamily="49" charset="0"/>
+              </a:rPr>
+              <a:t>aA.txt, folder1/Aa.txt</a:t>
+            </a:r>
+            <a:r>
               <a:rPr lang="en-GB" dirty="0">
-                <a:solidFill>
-                  <a:srgbClr val="FF0000"/>
-                </a:solidFill>
-              </a:rPr>
-              <a:t>seconds*4000</a:t>
-            </a:r>
-          </a:p>
-        </p:txBody>
-      </p:sp>
-      <p:sp>
-        <p:nvSpPr>
-          <p:cNvPr id="8" name="TextBox 7">
-            <a:extLst>
-              <a:ext uri="{FF2B5EF4-FFF2-40B4-BE49-F238E27FC236}">
-                <a16:creationId xmlns:a16="http://schemas.microsoft.com/office/drawing/2014/main" id="{CEA45F0C-FBAE-4F68-622E-0AA965AEF51E}"/>
-              </a:ext>
-            </a:extLst>
-          </p:cNvPr>
-          <p:cNvSpPr txBox="1"/>
-          <p:nvPr/>
-        </p:nvSpPr>
-        <p:spPr>
-          <a:xfrm rot="17788890">
-            <a:off x="2927129" y="4896473"/>
-            <a:ext cx="2422247" cy="369332"/>
-          </a:xfrm>
-          <a:prstGeom prst="rect">
-            <a:avLst/>
-          </a:prstGeom>
-          <a:noFill/>
-        </p:spPr>
-        <p:txBody>
-          <a:bodyPr wrap="square" rtlCol="0">
-            <a:spAutoFit/>
-          </a:bodyPr>
-          <a:lstStyle/>
-          <a:p>
-            <a:r>
-              <a:rPr lang="en-GB" dirty="0">
-                <a:solidFill>
-                  <a:srgbClr val="FF0000"/>
-                </a:solidFill>
-              </a:rPr>
-              <a:t>(minus) Force (</a:t>
-            </a:r>
-            <a:r>
-              <a:rPr lang="en-GB" dirty="0" err="1">
-                <a:solidFill>
-                  <a:srgbClr val="FF0000"/>
-                </a:solidFill>
+                <a:latin typeface="Consolas" panose="020B0609020204030204" pitchFamily="49" charset="0"/>
+              </a:rPr>
+              <a:t> </a:t>
+            </a:r>
+            <a:r>
+              <a:rPr lang="en-GB" dirty="0"/>
+              <a:t>or full path and filename</a:t>
+            </a:r>
+          </a:p>
+          <a:p>
+            <a:r>
+              <a:rPr lang="en-GB" sz="2600" dirty="0">
+                <a:latin typeface="Menlo"/>
+              </a:rPr>
+              <a:t>Outputs:</a:t>
+            </a:r>
+          </a:p>
+          <a:p>
+            <a:pPr lvl="1"/>
+            <a:r>
+              <a:rPr lang="en-GB" sz="2200" dirty="0">
+                <a:latin typeface="Menlo"/>
+              </a:rPr>
+              <a:t>t:  Time (seconds since experiment start)</a:t>
+            </a:r>
+          </a:p>
+          <a:p>
+            <a:pPr lvl="1"/>
+            <a:r>
+              <a:rPr lang="en-GB" sz="2200" dirty="0">
+                <a:latin typeface="Menlo"/>
+              </a:rPr>
+              <a:t>f:  Pulling force (</a:t>
+            </a:r>
+            <a:r>
+              <a:rPr lang="en-GB" sz="2200" dirty="0" err="1">
+                <a:latin typeface="Menlo"/>
               </a:rPr>
               <a:t>pN</a:t>
             </a:r>
             <a:r>
-              <a:rPr lang="en-GB" dirty="0">
-                <a:solidFill>
-                  <a:srgbClr val="FF0000"/>
-                </a:solidFill>
+              <a:rPr lang="en-GB" sz="2200" dirty="0">
+                <a:latin typeface="Menlo"/>
               </a:rPr>
               <a:t>)</a:t>
             </a:r>
           </a:p>
-        </p:txBody>
-      </p:sp>
-      <p:sp>
-        <p:nvSpPr>
-          <p:cNvPr id="9" name="TextBox 8">
-            <a:extLst>
-              <a:ext uri="{FF2B5EF4-FFF2-40B4-BE49-F238E27FC236}">
-                <a16:creationId xmlns:a16="http://schemas.microsoft.com/office/drawing/2014/main" id="{71E2011A-6411-D281-8C31-42CDB8C2C2B1}"/>
-              </a:ext>
-            </a:extLst>
-          </p:cNvPr>
-          <p:cNvSpPr txBox="1"/>
-          <p:nvPr/>
-        </p:nvSpPr>
-        <p:spPr>
-          <a:xfrm rot="17788890">
-            <a:off x="4521485" y="4987318"/>
-            <a:ext cx="2451570" cy="369332"/>
-          </a:xfrm>
-          <a:prstGeom prst="rect">
-            <a:avLst/>
-          </a:prstGeom>
-          <a:noFill/>
-        </p:spPr>
-        <p:txBody>
-          <a:bodyPr wrap="square" rtlCol="0">
-            <a:spAutoFit/>
-          </a:bodyPr>
-          <a:lstStyle/>
-          <a:p>
-            <a:r>
-              <a:rPr lang="en-GB" dirty="0">
-                <a:solidFill>
-                  <a:srgbClr val="FF0000"/>
-                </a:solidFill>
-              </a:rPr>
-              <a:t>(minus) Trap pos.  A</a:t>
-            </a:r>
-          </a:p>
-        </p:txBody>
-      </p:sp>
-      <p:pic>
-        <p:nvPicPr>
-          <p:cNvPr id="11" name="Picture 10">
-            <a:extLst>
-              <a:ext uri="{FF2B5EF4-FFF2-40B4-BE49-F238E27FC236}">
-                <a16:creationId xmlns:a16="http://schemas.microsoft.com/office/drawing/2014/main" id="{B7F959B8-282A-4B29-3339-16B963050805}"/>
-              </a:ext>
-            </a:extLst>
-          </p:cNvPr>
-          <p:cNvPicPr>
-            <a:picLocks noChangeAspect="1"/>
-          </p:cNvPicPr>
-          <p:nvPr/>
-        </p:nvPicPr>
-        <p:blipFill>
-          <a:blip r:embed="rId2"/>
-          <a:stretch>
-            <a:fillRect/>
-          </a:stretch>
-        </p:blipFill>
-        <p:spPr>
-          <a:xfrm>
-            <a:off x="2009204" y="1599626"/>
-            <a:ext cx="8173591" cy="2762636"/>
-          </a:xfrm>
-          <a:prstGeom prst="rect">
-            <a:avLst/>
-          </a:prstGeom>
-        </p:spPr>
-      </p:pic>
-      <p:sp>
-        <p:nvSpPr>
-          <p:cNvPr id="16" name="TextBox 15">
-            <a:extLst>
-              <a:ext uri="{FF2B5EF4-FFF2-40B4-BE49-F238E27FC236}">
-                <a16:creationId xmlns:a16="http://schemas.microsoft.com/office/drawing/2014/main" id="{B7C652D4-8A1C-53A7-7DE6-94BA871903B3}"/>
-              </a:ext>
-            </a:extLst>
-          </p:cNvPr>
-          <p:cNvSpPr txBox="1"/>
-          <p:nvPr/>
-        </p:nvSpPr>
-        <p:spPr>
-          <a:xfrm rot="17788890">
-            <a:off x="5336049" y="5061835"/>
-            <a:ext cx="2192522" cy="369332"/>
-          </a:xfrm>
-          <a:prstGeom prst="rect">
-            <a:avLst/>
-          </a:prstGeom>
-          <a:noFill/>
-        </p:spPr>
-        <p:txBody>
-          <a:bodyPr wrap="square" rtlCol="0">
-            <a:spAutoFit/>
-          </a:bodyPr>
-          <a:lstStyle/>
-          <a:p>
-            <a:r>
-              <a:rPr lang="en-GB" dirty="0">
-                <a:solidFill>
-                  <a:srgbClr val="FF0000"/>
-                </a:solidFill>
-              </a:rPr>
-              <a:t>(minus) Trap pos.  B</a:t>
-            </a:r>
-          </a:p>
-        </p:txBody>
-      </p:sp>
-      <p:sp>
-        <p:nvSpPr>
-          <p:cNvPr id="17" name="TextBox 16">
-            <a:extLst>
-              <a:ext uri="{FF2B5EF4-FFF2-40B4-BE49-F238E27FC236}">
-                <a16:creationId xmlns:a16="http://schemas.microsoft.com/office/drawing/2014/main" id="{9DFCE763-CF36-557C-1769-93EA11A1FF0E}"/>
-              </a:ext>
-            </a:extLst>
-          </p:cNvPr>
-          <p:cNvSpPr txBox="1"/>
-          <p:nvPr/>
-        </p:nvSpPr>
-        <p:spPr>
-          <a:xfrm rot="17788890">
-            <a:off x="6164288" y="5153254"/>
-            <a:ext cx="1988253" cy="369332"/>
-          </a:xfrm>
-          <a:prstGeom prst="rect">
-            <a:avLst/>
-          </a:prstGeom>
-          <a:noFill/>
-        </p:spPr>
-        <p:txBody>
-          <a:bodyPr wrap="square" rtlCol="0">
-            <a:spAutoFit/>
-          </a:bodyPr>
-          <a:lstStyle/>
-          <a:p>
-            <a:r>
-              <a:rPr lang="en-GB" dirty="0">
-                <a:solidFill>
-                  <a:srgbClr val="FF0000"/>
-                </a:solidFill>
-              </a:rPr>
-              <a:t>Temperature code</a:t>
-            </a:r>
-          </a:p>
-        </p:txBody>
-      </p:sp>
-      <p:sp>
-        <p:nvSpPr>
-          <p:cNvPr id="18" name="TextBox 17">
-            <a:extLst>
-              <a:ext uri="{FF2B5EF4-FFF2-40B4-BE49-F238E27FC236}">
-                <a16:creationId xmlns:a16="http://schemas.microsoft.com/office/drawing/2014/main" id="{AFF007E3-6BCE-3E8C-5621-27522A29897F}"/>
-              </a:ext>
-            </a:extLst>
-          </p:cNvPr>
-          <p:cNvSpPr txBox="1"/>
-          <p:nvPr/>
-        </p:nvSpPr>
-        <p:spPr>
-          <a:xfrm>
-            <a:off x="8641080" y="4636008"/>
-            <a:ext cx="2712720" cy="646331"/>
-          </a:xfrm>
-          <a:prstGeom prst="rect">
-            <a:avLst/>
-          </a:prstGeom>
-          <a:noFill/>
-        </p:spPr>
-        <p:txBody>
-          <a:bodyPr wrap="square" rtlCol="0">
-            <a:spAutoFit/>
-          </a:bodyPr>
-          <a:lstStyle/>
-          <a:p>
-            <a:r>
-              <a:rPr lang="en-GB" dirty="0"/>
-              <a:t>Use mean of trap positions A and B</a:t>
-            </a:r>
-          </a:p>
-        </p:txBody>
-      </p:sp>
-      <p:sp>
-        <p:nvSpPr>
-          <p:cNvPr id="19" name="TextBox 18">
-            <a:extLst>
-              <a:ext uri="{FF2B5EF4-FFF2-40B4-BE49-F238E27FC236}">
-                <a16:creationId xmlns:a16="http://schemas.microsoft.com/office/drawing/2014/main" id="{5F300220-665E-39C3-5CAD-39DE6F4AE95F}"/>
-              </a:ext>
-            </a:extLst>
-          </p:cNvPr>
-          <p:cNvSpPr txBox="1"/>
-          <p:nvPr/>
-        </p:nvSpPr>
-        <p:spPr>
-          <a:xfrm>
-            <a:off x="8641080" y="1986992"/>
-            <a:ext cx="2829431" cy="369332"/>
-          </a:xfrm>
-          <a:prstGeom prst="rect">
-            <a:avLst/>
-          </a:prstGeom>
-          <a:noFill/>
-        </p:spPr>
-        <p:txBody>
-          <a:bodyPr wrap="square" rtlCol="0">
-            <a:spAutoFit/>
-          </a:bodyPr>
-          <a:lstStyle/>
-          <a:p>
-            <a:r>
-              <a:rPr lang="nb-NO" dirty="0"/>
-              <a:t>F</a:t>
-            </a:r>
-            <a:r>
-              <a:rPr lang="en-GB" dirty="0" err="1"/>
-              <a:t>irst</a:t>
-            </a:r>
-            <a:r>
-              <a:rPr lang="en-GB" dirty="0"/>
-              <a:t> record not relevant</a:t>
-            </a:r>
-          </a:p>
-        </p:txBody>
-      </p:sp>
-      <p:sp>
-        <p:nvSpPr>
-          <p:cNvPr id="20" name="Rectangle 19">
-            <a:extLst>
-              <a:ext uri="{FF2B5EF4-FFF2-40B4-BE49-F238E27FC236}">
-                <a16:creationId xmlns:a16="http://schemas.microsoft.com/office/drawing/2014/main" id="{8806A3B6-B7CD-383E-4F39-587614CA5FF7}"/>
-              </a:ext>
-            </a:extLst>
-          </p:cNvPr>
-          <p:cNvSpPr/>
-          <p:nvPr/>
-        </p:nvSpPr>
-        <p:spPr>
-          <a:xfrm>
-            <a:off x="2441448" y="1966920"/>
-            <a:ext cx="5907024" cy="226757"/>
-          </a:xfrm>
-          <a:prstGeom prst="rect">
-            <a:avLst/>
-          </a:prstGeom>
-          <a:noFill/>
-          <a:ln>
-            <a:solidFill>
-              <a:srgbClr val="FF0000"/>
-            </a:solidFill>
-          </a:ln>
-        </p:spPr>
-        <p:style>
-          <a:lnRef idx="2">
-            <a:schemeClr val="accent1">
-              <a:shade val="15000"/>
-            </a:schemeClr>
-          </a:lnRef>
-          <a:fillRef idx="1">
-            <a:schemeClr val="accent1"/>
-          </a:fillRef>
-          <a:effectRef idx="0">
-            <a:schemeClr val="accent1"/>
-          </a:effectRef>
-          <a:fontRef idx="minor">
-            <a:schemeClr val="lt1"/>
-          </a:fontRef>
-        </p:style>
-        <p:txBody>
-          <a:bodyPr rtlCol="0" anchor="ctr"/>
-          <a:lstStyle/>
-          <a:p>
-            <a:pPr algn="ctr"/>
-            <a:endParaRPr lang="en-GB"/>
+          <a:p>
+            <a:pPr lvl="1"/>
+            <a:r>
+              <a:rPr lang="en-GB" sz="2200" b="0" i="0" dirty="0">
+                <a:effectLst/>
+                <a:latin typeface="Menlo"/>
+              </a:rPr>
+              <a:t>x:  Trap position (nm)</a:t>
+            </a:r>
+          </a:p>
+          <a:p>
+            <a:pPr lvl="1"/>
+            <a:r>
+              <a:rPr lang="en-GB" sz="2200" b="0" i="0" dirty="0">
+                <a:effectLst/>
+                <a:latin typeface="Menlo"/>
+              </a:rPr>
+              <a:t>T: Temperature (˚C)</a:t>
+            </a:r>
+          </a:p>
+          <a:p>
+            <a:pPr lvl="2"/>
+            <a:endParaRPr lang="en-GB" dirty="0"/>
           </a:p>
         </p:txBody>
       </p:sp>
     </p:spTree>
     <p:extLst>
       <p:ext uri="{BB962C8B-B14F-4D97-AF65-F5344CB8AC3E}">
-        <p14:creationId xmlns:p14="http://schemas.microsoft.com/office/powerpoint/2010/main" val="2324055941"/>
+        <p14:creationId xmlns:p14="http://schemas.microsoft.com/office/powerpoint/2010/main" val="360236570"/>
       </p:ext>
     </p:extLst>
   </p:cSld>
@@ -7165,7 +7855,7 @@
           <p:cNvPr id="2" name="Title 1">
             <a:extLst>
               <a:ext uri="{FF2B5EF4-FFF2-40B4-BE49-F238E27FC236}">
-                <a16:creationId xmlns:a16="http://schemas.microsoft.com/office/drawing/2014/main" id="{DB7F49CA-6496-E90F-C8F5-AF667565FD24}"/>
+                <a16:creationId xmlns:a16="http://schemas.microsoft.com/office/drawing/2014/main" id="{F3BCD982-D8D4-97B6-6AB9-E644B003D527}"/>
               </a:ext>
             </a:extLst>
           </p:cNvPr>
@@ -7182,9 +7872,18 @@
           <a:lstStyle/>
           <a:p>
             <a:r>
-              <a:rPr lang="en-GB" dirty="0"/>
-              <a:t>Reading an experiment file</a:t>
-            </a:r>
+              <a:rPr lang="nb-NO" dirty="0" err="1"/>
+              <a:t>Toolboxes</a:t>
+            </a:r>
+            <a:r>
+              <a:rPr lang="nb-NO" dirty="0"/>
+              <a:t> </a:t>
+            </a:r>
+            <a:r>
+              <a:rPr lang="nb-NO" dirty="0" err="1"/>
+              <a:t>needed</a:t>
+            </a:r>
+            <a:endParaRPr lang="en-GB" dirty="0"/>
           </a:p>
         </p:txBody>
       </p:sp>
@@ -7193,7 +7892,7 @@
           <p:cNvPr id="3" name="Content Placeholder 2">
             <a:extLst>
               <a:ext uri="{FF2B5EF4-FFF2-40B4-BE49-F238E27FC236}">
-                <a16:creationId xmlns:a16="http://schemas.microsoft.com/office/drawing/2014/main" id="{EB4D6777-D1FB-FA52-F6AF-67F4665F7DD9}"/>
+                <a16:creationId xmlns:a16="http://schemas.microsoft.com/office/drawing/2014/main" id="{2FB49A49-3644-0AB1-3231-77D6C8458ABB}"/>
               </a:ext>
             </a:extLst>
           </p:cNvPr>
@@ -7206,144 +7905,57 @@
         </p:nvSpPr>
         <p:spPr/>
         <p:txBody>
-          <a:bodyPr>
-            <a:normAutofit/>
-          </a:bodyPr>
-          <a:lstStyle/>
-          <a:p>
-            <a:r>
-              <a:rPr lang="en-GB" sz="1800" b="0" i="0" dirty="0">
-                <a:effectLst/>
-                <a:latin typeface="Consolas" panose="020B0609020204030204" pitchFamily="49" charset="0"/>
-              </a:rPr>
-              <a:t>[</a:t>
-            </a:r>
-            <a:r>
-              <a:rPr lang="en-GB" sz="1800" b="0" i="0" dirty="0" err="1">
-                <a:effectLst/>
-                <a:latin typeface="Consolas" panose="020B0609020204030204" pitchFamily="49" charset="0"/>
-              </a:rPr>
-              <a:t>t,f,x,T</a:t>
-            </a:r>
-            <a:r>
-              <a:rPr lang="en-GB" sz="1800" b="0" i="0" dirty="0">
-                <a:effectLst/>
-                <a:latin typeface="Consolas" panose="020B0609020204030204" pitchFamily="49" charset="0"/>
-              </a:rPr>
-              <a:t>] = </a:t>
-            </a:r>
-            <a:r>
-              <a:rPr lang="en-GB" sz="1800" b="0" i="0" dirty="0" err="1">
-                <a:effectLst/>
-                <a:latin typeface="Consolas" panose="020B0609020204030204" pitchFamily="49" charset="0"/>
-              </a:rPr>
-              <a:t>read_experiment_file</a:t>
-            </a:r>
-            <a:r>
-              <a:rPr lang="en-GB" sz="1800" b="0" i="0" dirty="0">
-                <a:effectLst/>
-                <a:latin typeface="Consolas" panose="020B0609020204030204" pitchFamily="49" charset="0"/>
-              </a:rPr>
-              <a:t>(file);</a:t>
-            </a:r>
-          </a:p>
-          <a:p>
-            <a:r>
-              <a:rPr lang="en-GB" dirty="0"/>
-              <a:t>Inputs:</a:t>
-            </a:r>
-          </a:p>
-          <a:p>
-            <a:pPr lvl="1"/>
-            <a:r>
-              <a:rPr lang="en-GB" dirty="0"/>
-              <a:t>file: </a:t>
-            </a:r>
-            <a:r>
-              <a:rPr lang="en-GB" sz="2200" dirty="0">
-                <a:latin typeface="Consolas" panose="020B0609020204030204" pitchFamily="49" charset="0"/>
-              </a:rPr>
-              <a:t>aA.txt, folder1/Aa.txt</a:t>
-            </a:r>
-            <a:r>
-              <a:rPr lang="en-GB" dirty="0">
-                <a:latin typeface="Consolas" panose="020B0609020204030204" pitchFamily="49" charset="0"/>
-              </a:rPr>
+          <a:bodyPr/>
+          <a:lstStyle/>
+          <a:p>
+            <a:r>
+              <a:rPr lang="nb-NO" dirty="0" err="1"/>
+              <a:t>Optimization</a:t>
+            </a:r>
+            <a:r>
+              <a:rPr lang="nb-NO" dirty="0"/>
               <a:t> </a:t>
             </a:r>
             <a:r>
-              <a:rPr lang="en-GB" dirty="0"/>
-              <a:t>or full path and filename</a:t>
-            </a:r>
-          </a:p>
-          <a:p>
-            <a:r>
-              <a:rPr lang="en-GB" sz="2600" dirty="0">
-                <a:latin typeface="Menlo"/>
-              </a:rPr>
-              <a:t>Outputs:</a:t>
-            </a:r>
-          </a:p>
-          <a:p>
-            <a:pPr lvl="1"/>
-            <a:r>
-              <a:rPr lang="en-GB" sz="2200" dirty="0">
-                <a:latin typeface="Menlo"/>
-              </a:rPr>
-              <a:t>t:  Time (seconds since experiment start)</a:t>
-            </a:r>
-          </a:p>
-          <a:p>
-            <a:pPr lvl="1"/>
-            <a:r>
-              <a:rPr lang="en-GB" sz="2200" dirty="0">
-                <a:latin typeface="Menlo"/>
-              </a:rPr>
-              <a:t>f:  Pulling force (</a:t>
-            </a:r>
-            <a:r>
-              <a:rPr lang="en-GB" sz="2200" dirty="0" err="1">
-                <a:latin typeface="Menlo"/>
-              </a:rPr>
-              <a:t>pN</a:t>
-            </a:r>
-            <a:r>
-              <a:rPr lang="en-GB" sz="2200" dirty="0">
-                <a:latin typeface="Menlo"/>
-              </a:rPr>
-              <a:t>)</a:t>
-            </a:r>
-          </a:p>
-          <a:p>
-            <a:pPr lvl="1"/>
-            <a:r>
-              <a:rPr lang="en-GB" sz="2200" b="0" i="0" dirty="0">
-                <a:effectLst/>
-                <a:latin typeface="Menlo"/>
-              </a:rPr>
-              <a:t>x:  Trap position (nm)</a:t>
-            </a:r>
-          </a:p>
-          <a:p>
-            <a:pPr lvl="1"/>
-            <a:r>
-              <a:rPr lang="en-GB" sz="2200" b="0" i="0" dirty="0">
-                <a:effectLst/>
-                <a:latin typeface="Menlo"/>
-              </a:rPr>
-              <a:t>T: Temperature (˚C)</a:t>
-            </a:r>
-          </a:p>
-          <a:p>
-            <a:pPr lvl="2"/>
-            <a:endParaRPr lang="en-GB" dirty="0"/>
+              <a:rPr lang="nb-NO" dirty="0" err="1"/>
+              <a:t>toolbox</a:t>
+            </a:r>
+            <a:endParaRPr lang="nb-NO" dirty="0"/>
+          </a:p>
+          <a:p>
+            <a:r>
+              <a:rPr lang="nb-NO" dirty="0"/>
+              <a:t>Signal </a:t>
+            </a:r>
+            <a:r>
+              <a:rPr lang="en-GB" dirty="0"/>
+              <a:t>processing</a:t>
+            </a:r>
+            <a:r>
+              <a:rPr lang="nb-NO" dirty="0"/>
+              <a:t> </a:t>
+            </a:r>
+            <a:r>
+              <a:rPr lang="nb-NO" dirty="0" err="1"/>
+              <a:t>tb</a:t>
+            </a:r>
+            <a:r>
+              <a:rPr lang="nb-NO" dirty="0"/>
+              <a:t>.</a:t>
+            </a:r>
+          </a:p>
+          <a:p>
+            <a:r>
+              <a:rPr lang="en-GB" dirty="0"/>
+              <a:t>Statistics and machine learning tb.</a:t>
+            </a:r>
           </a:p>
         </p:txBody>
       </p:sp>
     </p:spTree>
     <p:extLst>
       <p:ext uri="{BB962C8B-B14F-4D97-AF65-F5344CB8AC3E}">
-        <p14:creationId xmlns:p14="http://schemas.microsoft.com/office/powerpoint/2010/main" val="360236570"/>
+        <p14:creationId xmlns:p14="http://schemas.microsoft.com/office/powerpoint/2010/main" val="3628613843"/>
       </p:ext>
     </p:extLst>
   </p:cSld>
@@ -7443,16 +8055,22 @@
               <a:buNone/>
             </a:pPr>
             <a:r>
-              <a:rPr lang="en-GB" dirty="0"/>
+              <a:rPr lang="en-GB" sz="2000" dirty="0">
+                <a:latin typeface="Consolas" panose="020B0609020204030204" pitchFamily="49" charset="0"/>
+              </a:rPr>
               <a:t>figure; </a:t>
             </a:r>
             <a:r>
-              <a:rPr lang="en-GB" dirty="0" err="1"/>
+              <a:rPr lang="en-GB" sz="2000" dirty="0" err="1">
+                <a:latin typeface="Consolas" panose="020B0609020204030204" pitchFamily="49" charset="0"/>
+              </a:rPr>
               <a:t>tiledlayout</a:t>
             </a:r>
             <a:r>
-              <a:rPr lang="en-GB" dirty="0"/>
-              <a:t>;</a:t>
+              <a:rPr lang="en-GB" sz="2000" dirty="0">
+                <a:latin typeface="Consolas" panose="020B0609020204030204" pitchFamily="49" charset="0"/>
+              </a:rPr>
+              <a:t>(2,1);</a:t>
             </a:r>
           </a:p>
           <a:p>
@@ -7460,85 +8078,125 @@
               <a:buNone/>
             </a:pPr>
             <a:r>
-              <a:rPr lang="en-GB" dirty="0"/>
+              <a:rPr lang="en-GB" sz="2000" dirty="0">
+                <a:latin typeface="Consolas" panose="020B0609020204030204" pitchFamily="49" charset="0"/>
+              </a:rPr>
               <a:t>ax1 = </a:t>
             </a:r>
             <a:r>
-              <a:rPr lang="en-GB" dirty="0" err="1"/>
+              <a:rPr lang="en-GB" sz="2000" dirty="0" err="1">
+                <a:latin typeface="Consolas" panose="020B0609020204030204" pitchFamily="49" charset="0"/>
+              </a:rPr>
               <a:t>nexttile</a:t>
             </a:r>
             <a:r>
-              <a:rPr lang="en-GB" dirty="0"/>
+              <a:rPr lang="en-GB" sz="2000" dirty="0">
+                <a:latin typeface="Consolas" panose="020B0609020204030204" pitchFamily="49" charset="0"/>
+              </a:rPr>
               <a:t>; plot(</a:t>
             </a:r>
             <a:r>
-              <a:rPr lang="en-GB" dirty="0" err="1"/>
+              <a:rPr lang="en-GB" sz="2000" dirty="0" err="1">
+                <a:latin typeface="Consolas" panose="020B0609020204030204" pitchFamily="49" charset="0"/>
+              </a:rPr>
               <a:t>t,f</a:t>
             </a:r>
             <a:r>
-              <a:rPr lang="en-GB" dirty="0"/>
+              <a:rPr lang="en-GB" sz="2000" dirty="0">
+                <a:latin typeface="Consolas" panose="020B0609020204030204" pitchFamily="49" charset="0"/>
+              </a:rPr>
               <a:t>); </a:t>
             </a:r>
             <a:r>
-              <a:rPr lang="en-GB" dirty="0" err="1"/>
+              <a:rPr lang="en-GB" sz="2000" dirty="0" err="1">
+                <a:latin typeface="Consolas" panose="020B0609020204030204" pitchFamily="49" charset="0"/>
+              </a:rPr>
               <a:t>xlabel</a:t>
             </a:r>
             <a:r>
-              <a:rPr lang="en-GB" dirty="0"/>
+              <a:rPr lang="en-GB" sz="2000" dirty="0">
+                <a:latin typeface="Consolas" panose="020B0609020204030204" pitchFamily="49" charset="0"/>
+              </a:rPr>
               <a:t> s; </a:t>
             </a:r>
             <a:r>
-              <a:rPr lang="en-GB" dirty="0" err="1"/>
+              <a:rPr lang="en-GB" sz="2000" dirty="0" err="1">
+                <a:latin typeface="Consolas" panose="020B0609020204030204" pitchFamily="49" charset="0"/>
+              </a:rPr>
               <a:t>ylabel</a:t>
             </a:r>
             <a:r>
-              <a:rPr lang="en-GB" dirty="0"/>
+              <a:rPr lang="en-GB" sz="2000" dirty="0">
+                <a:latin typeface="Consolas" panose="020B0609020204030204" pitchFamily="49" charset="0"/>
+              </a:rPr>
               <a:t> </a:t>
             </a:r>
             <a:r>
-              <a:rPr lang="en-GB" dirty="0" err="1"/>
+              <a:rPr lang="en-GB" sz="2000" dirty="0" err="1">
+                <a:latin typeface="Consolas" panose="020B0609020204030204" pitchFamily="49" charset="0"/>
+              </a:rPr>
               <a:t>pN</a:t>
             </a:r>
-            <a:endParaRPr lang="en-GB" dirty="0"/>
+            <a:endParaRPr lang="en-GB" sz="2000" dirty="0">
+              <a:latin typeface="Consolas" panose="020B0609020204030204" pitchFamily="49" charset="0"/>
+            </a:endParaRPr>
           </a:p>
           <a:p>
             <a:pPr marL="457200" lvl="1" indent="0">
               <a:buNone/>
             </a:pPr>
             <a:r>
-              <a:rPr lang="en-GB" dirty="0"/>
+              <a:rPr lang="en-GB" sz="2000" dirty="0">
+                <a:latin typeface="Consolas" panose="020B0609020204030204" pitchFamily="49" charset="0"/>
+              </a:rPr>
               <a:t>ax2 = </a:t>
             </a:r>
             <a:r>
-              <a:rPr lang="en-GB" dirty="0" err="1"/>
+              <a:rPr lang="en-GB" sz="2000" dirty="0" err="1">
+                <a:latin typeface="Consolas" panose="020B0609020204030204" pitchFamily="49" charset="0"/>
+              </a:rPr>
               <a:t>nexttile</a:t>
             </a:r>
             <a:r>
-              <a:rPr lang="en-GB" dirty="0"/>
+              <a:rPr lang="en-GB" sz="2000" dirty="0">
+                <a:latin typeface="Consolas" panose="020B0609020204030204" pitchFamily="49" charset="0"/>
+              </a:rPr>
               <a:t>; plot(</a:t>
             </a:r>
             <a:r>
-              <a:rPr lang="en-GB" dirty="0" err="1"/>
+              <a:rPr lang="en-GB" sz="2000" dirty="0" err="1">
+                <a:latin typeface="Consolas" panose="020B0609020204030204" pitchFamily="49" charset="0"/>
+              </a:rPr>
               <a:t>t,x</a:t>
             </a:r>
             <a:r>
-              <a:rPr lang="en-GB" dirty="0"/>
+              <a:rPr lang="en-GB" sz="2000" dirty="0">
+                <a:latin typeface="Consolas" panose="020B0609020204030204" pitchFamily="49" charset="0"/>
+              </a:rPr>
               <a:t>); </a:t>
             </a:r>
             <a:r>
-              <a:rPr lang="en-GB" dirty="0" err="1"/>
+              <a:rPr lang="en-GB" sz="2000" dirty="0" err="1">
+                <a:latin typeface="Consolas" panose="020B0609020204030204" pitchFamily="49" charset="0"/>
+              </a:rPr>
               <a:t>xlabel</a:t>
             </a:r>
             <a:r>
-              <a:rPr lang="en-GB" dirty="0"/>
+              <a:rPr lang="en-GB" sz="2000" dirty="0">
+                <a:latin typeface="Consolas" panose="020B0609020204030204" pitchFamily="49" charset="0"/>
+              </a:rPr>
               <a:t> s; </a:t>
             </a:r>
             <a:r>
-              <a:rPr lang="en-GB" dirty="0" err="1"/>
+              <a:rPr lang="en-GB" sz="2000" dirty="0" err="1">
+                <a:latin typeface="Consolas" panose="020B0609020204030204" pitchFamily="49" charset="0"/>
+              </a:rPr>
               <a:t>ylabel</a:t>
             </a:r>
             <a:r>
-              <a:rPr lang="en-GB" dirty="0"/>
+              <a:rPr lang="en-GB" sz="2000" dirty="0">
+                <a:latin typeface="Consolas" panose="020B0609020204030204" pitchFamily="49" charset="0"/>
+              </a:rPr>
               <a:t> nm</a:t>
             </a:r>
           </a:p>
@@ -7547,12 +8205,16 @@
               <a:buNone/>
             </a:pPr>
             <a:r>
-              <a:rPr lang="en-GB" dirty="0" err="1"/>
+              <a:rPr lang="en-GB" sz="2000" dirty="0" err="1">
+                <a:latin typeface="Consolas" panose="020B0609020204030204" pitchFamily="49" charset="0"/>
+              </a:rPr>
               <a:t>linkaxes</a:t>
             </a:r>
             <a:r>
-              <a:rPr lang="en-GB" dirty="0"/>
-              <a:t>([ax1,ax2],'x’)  % Couple zoom and pan in both axes</a:t>
+              <a:rPr lang="en-GB" sz="2000" dirty="0">
+                <a:latin typeface="Consolas" panose="020B0609020204030204" pitchFamily="49" charset="0"/>
+              </a:rPr>
+              <a:t>([ax1,ax2],'x')  % Couple zoom and pan in both axes</a:t>
             </a:r>
           </a:p>
           <a:p>
@@ -7714,6 +8376,28 @@
           <a:p>
             <a:r>
               <a:rPr lang="en-GB" dirty="0"/>
+              <a:t>Use the </a:t>
+            </a:r>
+            <a:r>
+              <a:rPr lang="en-GB" dirty="0" err="1"/>
+              <a:t>datacursor</a:t>
+            </a:r>
+            <a:r>
+              <a:rPr lang="en-GB" dirty="0"/>
+              <a:t> symbol in the axes </a:t>
+            </a:r>
+            <a:r>
+              <a:rPr lang="en-GB" dirty="0" err="1"/>
+              <a:t>toolbart</a:t>
+            </a:r>
+            <a:r>
+              <a:rPr lang="en-GB" dirty="0"/>
+              <a:t> o  read the x and f vales for the zip </a:t>
+            </a:r>
+          </a:p>
+          <a:p>
+            <a:r>
+              <a:rPr lang="en-GB" dirty="0"/>
               <a:t>Do the automatic rips and zips agree with yours?</a:t>
             </a:r>
           </a:p>
@@ -7728,6 +8412,36 @@
           </a:p>
         </p:txBody>
       </p:sp>
+      <p:pic>
+        <p:nvPicPr>
+          <p:cNvPr id="5" name="Picture 4">
+            <a:extLst>
+              <a:ext uri="{FF2B5EF4-FFF2-40B4-BE49-F238E27FC236}">
+                <a16:creationId xmlns:a16="http://schemas.microsoft.com/office/drawing/2014/main" id="{918C5822-2E17-03CC-F5FA-E4E0429F4185}"/>
+              </a:ext>
+            </a:extLst>
+          </p:cNvPr>
+          <p:cNvPicPr>
+            <a:picLocks noChangeAspect="1"/>
+          </p:cNvPicPr>
+          <p:nvPr/>
+        </p:nvPicPr>
+        <p:blipFill>
+          <a:blip r:embed="rId2"/>
+          <a:stretch>
+            <a:fillRect/>
+          </a:stretch>
+        </p:blipFill>
+        <p:spPr>
+          <a:xfrm>
+            <a:off x="3651397" y="3429000"/>
+            <a:ext cx="276264" cy="352474"/>
+          </a:xfrm>
+          <a:prstGeom prst="rect">
+            <a:avLst/>
+          </a:prstGeom>
+        </p:spPr>
+      </p:pic>
     </p:spTree>
     <p:extLst>
       <p:ext uri="{BB962C8B-B14F-4D97-AF65-F5344CB8AC3E}">

</xml_diff>